<commit_message>
bofa master slide template finalized
</commit_message>
<xml_diff>
--- a/study1.pptx
+++ b/study1.pptx
@@ -5,7 +5,7 @@
     <p:sldMasterId id="2147483684" r:id="rId1"/>
   </p:sldMasterIdLst>
   <p:notesMasterIdLst>
-    <p:notesMasterId r:id="rId15"/>
+    <p:notesMasterId r:id="rId17"/>
   </p:notesMasterIdLst>
   <p:sldIdLst>
     <p:sldId id="256" r:id="rId2"/>
@@ -21,6 +21,8 @@
     <p:sldId id="266" r:id="rId12"/>
     <p:sldId id="267" r:id="rId13"/>
     <p:sldId id="268" r:id="rId14"/>
+    <p:sldId id="269" r:id="rId15"/>
+    <p:sldId id="270" r:id="rId16"/>
   </p:sldIdLst>
   <p:sldSz cx="10067925" cy="7543800"/>
   <p:notesSz cx="6858000" cy="9144000"/>
@@ -209,7 +211,7 @@
           <a:p>
             <a:fld id="{CC3AD12C-9F34-4086-BC49-03E04A3FD7E1}" type="datetimeFigureOut">
               <a:rPr lang="en-US" smtClean="0"/>
-              <a:t>6/28/23</a:t>
+              <a:t>7/5/23</a:t>
             </a:fld>
             <a:endParaRPr lang="en-US"/>
           </a:p>
@@ -525,18 +527,8 @@
             </a:pPr>
             <a:r>
               <a:rPr/>
-              <a:t>Here are some speaker notes!</a:t>
-            </a:r>
-          </a:p>
-          <a:p>
-            <a:pPr lvl="0" indent="0" marL="0">
-              <a:buNone/>
-            </a:pPr>
-          </a:p>
-          <a:p>
-            <a:pPr lvl="0" indent="0" marL="0">
-              <a:buNone/>
-            </a:pPr>
+              <a:t>Here are some speaker notes! </a:t>
+            </a:r>
             <a:r>
               <a:rPr i="1"/>
               <a:t>This layout is used for all slides which do not match the criteria for another layout.</a:t>
@@ -621,7 +613,7 @@
             </a:pPr>
             <a:r>
               <a:rPr/>
-              <a:t>This should be a blank slide! SLIDE 7</a:t>
+              <a:t>If using images for ‘two contents’, you can’t have h3 sub title (## Sub title).</a:t>
             </a:r>
           </a:p>
         </p:txBody>
@@ -643,7 +635,7 @@
           <a:p>
             <a:fld id="{5C8B6E85-5011-4D87-94BA-0609773ED8C6}" type="slidenum">
               <a:rPr lang="en-US"/>
-              <a:t>7</a:t>
+              <a:t>5</a:t>
             </a:fld>
             <a:endParaRPr lang="en-US"/>
           </a:p>
@@ -703,21 +695,7 @@
             </a:pPr>
             <a:r>
               <a:rPr/>
-              <a:t>notes here - slide 9, can we make a title only?</a:t>
-            </a:r>
-          </a:p>
-          <a:p>
-            <a:pPr lvl="0" indent="0" marL="0">
-              <a:buNone/>
-            </a:pPr>
-          </a:p>
-          <a:p>
-            <a:pPr lvl="0" indent="0" marL="0">
-              <a:buNone/>
-            </a:pPr>
-            <a:r>
-              <a:rPr/>
-              <a:t>NOTE - the font sizes don’t look right with sub and subsub bullets!</a:t>
+              <a:t>If using images for ‘two contents’, you can’t have h3 sub title (## Sub title).</a:t>
             </a:r>
           </a:p>
         </p:txBody>
@@ -739,7 +717,7 @@
           <a:p>
             <a:fld id="{5C8B6E85-5011-4D87-94BA-0609773ED8C6}" type="slidenum">
               <a:rPr lang="en-US"/>
-              <a:t>9</a:t>
+              <a:t>6</a:t>
             </a:fld>
             <a:endParaRPr lang="en-US"/>
           </a:p>
@@ -799,7 +777,7 @@
             </a:pPr>
             <a:r>
               <a:rPr/>
-              <a:t>This should be a blank slide!</a:t>
+              <a:t>You can only use images for both columns for ‘comparison’ slide. You cannot use a mix of image and text for ‘comparison’ slide.</a:t>
             </a:r>
           </a:p>
         </p:txBody>
@@ -821,7 +799,349 @@
           <a:p>
             <a:fld id="{5C8B6E85-5011-4D87-94BA-0609773ED8C6}" type="slidenum">
               <a:rPr lang="en-US"/>
-              <a:t>13</a:t>
+              <a:t>7</a:t>
+            </a:fld>
+            <a:endParaRPr lang="en-US"/>
+          </a:p>
+        </p:txBody>
+      </p:sp>
+    </p:spTree>
+  </p:cSld>
+</p:notes>
+</file>
+
+<file path=ppt/notesSlides/notesSlide5.xml><?xml version="1.0" encoding="utf-8"?>
+<p:notes xmlns:a="http://schemas.openxmlformats.org/drawingml/2006/main" xmlns:r="http://schemas.openxmlformats.org/officeDocument/2006/relationships" xmlns:p="http://schemas.openxmlformats.org/presentationml/2006/main">
+  <p:cSld>
+    <p:spTree>
+      <p:nvGrpSpPr>
+        <p:cNvPr id="1" name=""/>
+        <p:cNvGrpSpPr/>
+        <p:nvPr/>
+      </p:nvGrpSpPr>
+      <p:grpSpPr>
+        <a:xfrm>
+          <a:off x="0" y="0"/>
+          <a:ext cx="0" cy="0"/>
+          <a:chOff x="0" y="0"/>
+          <a:chExt cx="0" cy="0"/>
+        </a:xfrm>
+      </p:grpSpPr>
+      <p:sp>
+        <p:nvSpPr>
+          <p:cNvPr id="2" name="Slide Image Placeholder 1"/>
+          <p:cNvSpPr>
+            <a:spLocks noGrp="1" noRot="1" noChangeAspect="1"/>
+          </p:cNvSpPr>
+          <p:nvPr>
+            <p:ph type="sldImg"/>
+          </p:nvPr>
+        </p:nvSpPr>
+        <p:spPr/>
+      </p:sp>
+      <p:sp>
+        <p:nvSpPr>
+          <p:cNvPr id="3" name="Notes Placeholder 2"/>
+          <p:cNvSpPr>
+            <a:spLocks noGrp="1"/>
+          </p:cNvSpPr>
+          <p:nvPr>
+            <p:ph type="body" idx="1"/>
+          </p:nvPr>
+        </p:nvSpPr>
+        <p:spPr/>
+        <p:txBody>
+          <a:bodyPr/>
+          <a:lstStyle/>
+          <a:p>
+            <a:pPr lvl="0" indent="0" marL="0">
+              <a:buNone/>
+            </a:pPr>
+            <a:r>
+              <a:rPr/>
+              <a:t>Use of columns (::::{.columns}) will result use of ‘two contents’ or ‘comparison’ slides instead of ‘content with caption’.</a:t>
+            </a:r>
+          </a:p>
+        </p:txBody>
+      </p:sp>
+      <p:sp>
+        <p:nvSpPr>
+          <p:cNvPr id="4" name="Slide Number Placeholder 3"/>
+          <p:cNvSpPr>
+            <a:spLocks noGrp="1"/>
+          </p:cNvSpPr>
+          <p:nvPr>
+            <p:ph type="sldNum" sz="quarter" idx="10"/>
+          </p:nvPr>
+        </p:nvSpPr>
+        <p:spPr/>
+        <p:txBody>
+          <a:bodyPr/>
+          <a:lstStyle/>
+          <a:p>
+            <a:fld id="{5C8B6E85-5011-4D87-94BA-0609773ED8C6}" type="slidenum">
+              <a:rPr lang="en-US"/>
+              <a:t>8</a:t>
+            </a:fld>
+            <a:endParaRPr lang="en-US"/>
+          </a:p>
+        </p:txBody>
+      </p:sp>
+    </p:spTree>
+  </p:cSld>
+</p:notes>
+</file>
+
+<file path=ppt/notesSlides/notesSlide6.xml><?xml version="1.0" encoding="utf-8"?>
+<p:notes xmlns:a="http://schemas.openxmlformats.org/drawingml/2006/main" xmlns:r="http://schemas.openxmlformats.org/officeDocument/2006/relationships" xmlns:p="http://schemas.openxmlformats.org/presentationml/2006/main">
+  <p:cSld>
+    <p:spTree>
+      <p:nvGrpSpPr>
+        <p:cNvPr id="1" name=""/>
+        <p:cNvGrpSpPr/>
+        <p:nvPr/>
+      </p:nvGrpSpPr>
+      <p:grpSpPr>
+        <a:xfrm>
+          <a:off x="0" y="0"/>
+          <a:ext cx="0" cy="0"/>
+          <a:chOff x="0" y="0"/>
+          <a:chExt cx="0" cy="0"/>
+        </a:xfrm>
+      </p:grpSpPr>
+      <p:sp>
+        <p:nvSpPr>
+          <p:cNvPr id="2" name="Slide Image Placeholder 1"/>
+          <p:cNvSpPr>
+            <a:spLocks noGrp="1" noRot="1" noChangeAspect="1"/>
+          </p:cNvSpPr>
+          <p:nvPr>
+            <p:ph type="sldImg"/>
+          </p:nvPr>
+        </p:nvSpPr>
+        <p:spPr/>
+      </p:sp>
+      <p:sp>
+        <p:nvSpPr>
+          <p:cNvPr id="3" name="Notes Placeholder 2"/>
+          <p:cNvSpPr>
+            <a:spLocks noGrp="1"/>
+          </p:cNvSpPr>
+          <p:nvPr>
+            <p:ph type="body" idx="1"/>
+          </p:nvPr>
+        </p:nvSpPr>
+        <p:spPr/>
+        <p:txBody>
+          <a:bodyPr/>
+          <a:lstStyle/>
+          <a:p>
+            <a:pPr lvl="0" indent="0" marL="0">
+              <a:buNone/>
+            </a:pPr>
+            <a:r>
+              <a:rPr/>
+              <a:t>This should be a blank slide! SLIDE 8</a:t>
+            </a:r>
+          </a:p>
+        </p:txBody>
+      </p:sp>
+      <p:sp>
+        <p:nvSpPr>
+          <p:cNvPr id="4" name="Slide Number Placeholder 3"/>
+          <p:cNvSpPr>
+            <a:spLocks noGrp="1"/>
+          </p:cNvSpPr>
+          <p:nvPr>
+            <p:ph type="sldNum" sz="quarter" idx="10"/>
+          </p:nvPr>
+        </p:nvSpPr>
+        <p:spPr/>
+        <p:txBody>
+          <a:bodyPr/>
+          <a:lstStyle/>
+          <a:p>
+            <a:fld id="{5C8B6E85-5011-4D87-94BA-0609773ED8C6}" type="slidenum">
+              <a:rPr lang="en-US"/>
+              <a:t>9</a:t>
+            </a:fld>
+            <a:endParaRPr lang="en-US"/>
+          </a:p>
+        </p:txBody>
+      </p:sp>
+    </p:spTree>
+  </p:cSld>
+</p:notes>
+</file>
+
+<file path=ppt/notesSlides/notesSlide7.xml><?xml version="1.0" encoding="utf-8"?>
+<p:notes xmlns:a="http://schemas.openxmlformats.org/drawingml/2006/main" xmlns:r="http://schemas.openxmlformats.org/officeDocument/2006/relationships" xmlns:p="http://schemas.openxmlformats.org/presentationml/2006/main">
+  <p:cSld>
+    <p:spTree>
+      <p:nvGrpSpPr>
+        <p:cNvPr id="1" name=""/>
+        <p:cNvGrpSpPr/>
+        <p:nvPr/>
+      </p:nvGrpSpPr>
+      <p:grpSpPr>
+        <a:xfrm>
+          <a:off x="0" y="0"/>
+          <a:ext cx="0" cy="0"/>
+          <a:chOff x="0" y="0"/>
+          <a:chExt cx="0" cy="0"/>
+        </a:xfrm>
+      </p:grpSpPr>
+      <p:sp>
+        <p:nvSpPr>
+          <p:cNvPr id="2" name="Slide Image Placeholder 1"/>
+          <p:cNvSpPr>
+            <a:spLocks noGrp="1" noRot="1" noChangeAspect="1"/>
+          </p:cNvSpPr>
+          <p:nvPr>
+            <p:ph type="sldImg"/>
+          </p:nvPr>
+        </p:nvSpPr>
+        <p:spPr/>
+      </p:sp>
+      <p:sp>
+        <p:nvSpPr>
+          <p:cNvPr id="3" name="Notes Placeholder 2"/>
+          <p:cNvSpPr>
+            <a:spLocks noGrp="1"/>
+          </p:cNvSpPr>
+          <p:nvPr>
+            <p:ph type="body" idx="1"/>
+          </p:nvPr>
+        </p:nvSpPr>
+        <p:spPr/>
+        <p:txBody>
+          <a:bodyPr/>
+          <a:lstStyle/>
+          <a:p>
+            <a:pPr lvl="0" indent="0" marL="0">
+              <a:buNone/>
+            </a:pPr>
+            <a:r>
+              <a:rPr/>
+              <a:t>notes here - slide 9, can we make a title only?</a:t>
+            </a:r>
+          </a:p>
+          <a:p>
+            <a:pPr lvl="0" indent="0" marL="0">
+              <a:buNone/>
+            </a:pPr>
+          </a:p>
+          <a:p>
+            <a:pPr lvl="0" indent="0" marL="0">
+              <a:buNone/>
+            </a:pPr>
+            <a:r>
+              <a:rPr/>
+              <a:t>NOTE - the font sizes don’t look right with sub and subsub bullets!</a:t>
+            </a:r>
+          </a:p>
+        </p:txBody>
+      </p:sp>
+      <p:sp>
+        <p:nvSpPr>
+          <p:cNvPr id="4" name="Slide Number Placeholder 3"/>
+          <p:cNvSpPr>
+            <a:spLocks noGrp="1"/>
+          </p:cNvSpPr>
+          <p:nvPr>
+            <p:ph type="sldNum" sz="quarter" idx="10"/>
+          </p:nvPr>
+        </p:nvSpPr>
+        <p:spPr/>
+        <p:txBody>
+          <a:bodyPr/>
+          <a:lstStyle/>
+          <a:p>
+            <a:fld id="{5C8B6E85-5011-4D87-94BA-0609773ED8C6}" type="slidenum">
+              <a:rPr lang="en-US"/>
+              <a:t>11</a:t>
+            </a:fld>
+            <a:endParaRPr lang="en-US"/>
+          </a:p>
+        </p:txBody>
+      </p:sp>
+    </p:spTree>
+  </p:cSld>
+</p:notes>
+</file>
+
+<file path=ppt/notesSlides/notesSlide8.xml><?xml version="1.0" encoding="utf-8"?>
+<p:notes xmlns:a="http://schemas.openxmlformats.org/drawingml/2006/main" xmlns:r="http://schemas.openxmlformats.org/officeDocument/2006/relationships" xmlns:p="http://schemas.openxmlformats.org/presentationml/2006/main">
+  <p:cSld>
+    <p:spTree>
+      <p:nvGrpSpPr>
+        <p:cNvPr id="1" name=""/>
+        <p:cNvGrpSpPr/>
+        <p:nvPr/>
+      </p:nvGrpSpPr>
+      <p:grpSpPr>
+        <a:xfrm>
+          <a:off x="0" y="0"/>
+          <a:ext cx="0" cy="0"/>
+          <a:chOff x="0" y="0"/>
+          <a:chExt cx="0" cy="0"/>
+        </a:xfrm>
+      </p:grpSpPr>
+      <p:sp>
+        <p:nvSpPr>
+          <p:cNvPr id="2" name="Slide Image Placeholder 1"/>
+          <p:cNvSpPr>
+            <a:spLocks noGrp="1" noRot="1" noChangeAspect="1"/>
+          </p:cNvSpPr>
+          <p:nvPr>
+            <p:ph type="sldImg"/>
+          </p:nvPr>
+        </p:nvSpPr>
+        <p:spPr/>
+      </p:sp>
+      <p:sp>
+        <p:nvSpPr>
+          <p:cNvPr id="3" name="Notes Placeholder 2"/>
+          <p:cNvSpPr>
+            <a:spLocks noGrp="1"/>
+          </p:cNvSpPr>
+          <p:nvPr>
+            <p:ph type="body" idx="1"/>
+          </p:nvPr>
+        </p:nvSpPr>
+        <p:spPr/>
+        <p:txBody>
+          <a:bodyPr/>
+          <a:lstStyle/>
+          <a:p>
+            <a:pPr lvl="0" indent="0" marL="0">
+              <a:buNone/>
+            </a:pPr>
+            <a:r>
+              <a:rPr/>
+              <a:t>This should be a blank slide!</a:t>
+            </a:r>
+          </a:p>
+        </p:txBody>
+      </p:sp>
+      <p:sp>
+        <p:nvSpPr>
+          <p:cNvPr id="4" name="Slide Number Placeholder 3"/>
+          <p:cNvSpPr>
+            <a:spLocks noGrp="1"/>
+          </p:cNvSpPr>
+          <p:nvPr>
+            <p:ph type="sldNum" sz="quarter" idx="10"/>
+          </p:nvPr>
+        </p:nvSpPr>
+        <p:spPr/>
+        <p:txBody>
+          <a:bodyPr/>
+          <a:lstStyle/>
+          <a:p>
+            <a:fld id="{5C8B6E85-5011-4D87-94BA-0609773ED8C6}" type="slidenum">
+              <a:rPr lang="en-US"/>
+              <a:t>15</a:t>
             </a:fld>
             <a:endParaRPr lang="en-US"/>
           </a:p>
@@ -849,119 +1169,17 @@
           <a:chExt cx="0" cy="0"/>
         </a:xfrm>
       </p:grpSpPr>
-      <p:sp>
-        <p:nvSpPr>
-          <p:cNvPr id="2" name="Title 1"/>
-          <p:cNvSpPr>
-            <a:spLocks noGrp="1"/>
-          </p:cNvSpPr>
-          <p:nvPr>
-            <p:ph type="ctrTitle"/>
-          </p:nvPr>
-        </p:nvSpPr>
-        <p:spPr>
-          <a:xfrm>
-            <a:off x="356616" y="1261872"/>
-            <a:ext cx="9354312" cy="722376"/>
-          </a:xfrm>
-        </p:spPr>
-        <p:txBody>
-          <a:bodyPr anchor="ctr">
-            <a:noAutofit/>
-          </a:bodyPr>
-          <a:lstStyle>
-            <a:lvl1pPr algn="l">
-              <a:defRPr sz="4800" b="0">
-                <a:latin typeface="Calibri" panose="020F0502020204030204" pitchFamily="34" charset="0"/>
-                <a:cs typeface="Calibri" panose="020F0502020204030204" pitchFamily="34" charset="0"/>
-              </a:defRPr>
-            </a:lvl1pPr>
-          </a:lstStyle>
-          <a:p>
-            <a:r>
-              <a:rPr lang="en-US" dirty="0"/>
-              <a:t>Click to edit Master title style</a:t>
-            </a:r>
-          </a:p>
-        </p:txBody>
-      </p:sp>
-      <p:sp>
-        <p:nvSpPr>
-          <p:cNvPr id="3" name="Subtitle 2"/>
-          <p:cNvSpPr>
-            <a:spLocks noGrp="1"/>
-          </p:cNvSpPr>
-          <p:nvPr>
-            <p:ph type="subTitle" idx="1"/>
-          </p:nvPr>
-        </p:nvSpPr>
-        <p:spPr>
-          <a:xfrm>
-            <a:off x="356616" y="2139696"/>
-            <a:ext cx="9354312" cy="356616"/>
-          </a:xfrm>
-        </p:spPr>
-        <p:txBody>
-          <a:bodyPr anchor="ctr">
-            <a:noAutofit/>
-          </a:bodyPr>
-          <a:lstStyle>
-            <a:lvl1pPr marL="0" indent="0" algn="l">
-              <a:buNone/>
-              <a:defRPr sz="2400"/>
-            </a:lvl1pPr>
-            <a:lvl2pPr marL="502920" indent="0" algn="ctr">
-              <a:buNone/>
-              <a:defRPr sz="2200"/>
-            </a:lvl2pPr>
-            <a:lvl3pPr marL="1005840" indent="0" algn="ctr">
-              <a:buNone/>
-              <a:defRPr sz="1980"/>
-            </a:lvl3pPr>
-            <a:lvl4pPr marL="1508760" indent="0" algn="ctr">
-              <a:buNone/>
-              <a:defRPr sz="1760"/>
-            </a:lvl4pPr>
-            <a:lvl5pPr marL="2011680" indent="0" algn="ctr">
-              <a:buNone/>
-              <a:defRPr sz="1760"/>
-            </a:lvl5pPr>
-            <a:lvl6pPr marL="2514600" indent="0" algn="ctr">
-              <a:buNone/>
-              <a:defRPr sz="1760"/>
-            </a:lvl6pPr>
-            <a:lvl7pPr marL="3017520" indent="0" algn="ctr">
-              <a:buNone/>
-              <a:defRPr sz="1760"/>
-            </a:lvl7pPr>
-            <a:lvl8pPr marL="3520440" indent="0" algn="ctr">
-              <a:buNone/>
-              <a:defRPr sz="1760"/>
-            </a:lvl8pPr>
-            <a:lvl9pPr marL="4023360" indent="0" algn="ctr">
-              <a:buNone/>
-              <a:defRPr sz="1760"/>
-            </a:lvl9pPr>
-          </a:lstStyle>
-          <a:p>
-            <a:r>
-              <a:rPr lang="en-US" dirty="0"/>
-              <a:t>Click to edit Master subtitle style</a:t>
-            </a:r>
-          </a:p>
-        </p:txBody>
-      </p:sp>
       <p:pic>
         <p:nvPicPr>
-          <p:cNvPr id="7" name="Picture 6">
+          <p:cNvPr id="11" name="Picture 10">
             <a:extLst>
               <a:ext uri="{FF2B5EF4-FFF2-40B4-BE49-F238E27FC236}">
-                <a16:creationId xmlns:a16="http://schemas.microsoft.com/office/drawing/2014/main" id="{F2262B54-817E-FA07-354A-2206A17060F4}"/>
+                <a16:creationId xmlns:a16="http://schemas.microsoft.com/office/drawing/2014/main" id="{49992711-36BF-E872-6AD6-F65E57EAA4DB}"/>
               </a:ext>
             </a:extLst>
           </p:cNvPr>
           <p:cNvPicPr>
-            <a:picLocks/>
+            <a:picLocks noChangeAspect="1"/>
           </p:cNvPicPr>
           <p:nvPr userDrawn="1"/>
         </p:nvPicPr>
@@ -979,14 +1197,128 @@
         </p:blipFill>
         <p:spPr>
           <a:xfrm>
-            <a:off x="0" y="4882896"/>
-            <a:ext cx="10067544" cy="1161288"/>
+            <a:off x="0" y="1901952"/>
+            <a:ext cx="10084722" cy="4087368"/>
           </a:xfrm>
           <a:prstGeom prst="rect">
             <a:avLst/>
           </a:prstGeom>
         </p:spPr>
       </p:pic>
+      <p:sp>
+        <p:nvSpPr>
+          <p:cNvPr id="2" name="Title 1"/>
+          <p:cNvSpPr>
+            <a:spLocks noGrp="1"/>
+          </p:cNvSpPr>
+          <p:nvPr>
+            <p:ph type="ctrTitle"/>
+          </p:nvPr>
+        </p:nvSpPr>
+        <p:spPr>
+          <a:xfrm>
+            <a:off x="356616" y="2795958"/>
+            <a:ext cx="6601232" cy="722376"/>
+          </a:xfrm>
+        </p:spPr>
+        <p:txBody>
+          <a:bodyPr anchor="b">
+            <a:noAutofit/>
+          </a:bodyPr>
+          <a:lstStyle>
+            <a:lvl1pPr algn="l">
+              <a:lnSpc>
+                <a:spcPts val="3600"/>
+              </a:lnSpc>
+              <a:defRPr sz="4000" b="1">
+                <a:solidFill>
+                  <a:schemeClr val="bg1"/>
+                </a:solidFill>
+                <a:latin typeface="Calibri" panose="020F0502020204030204" pitchFamily="34" charset="0"/>
+                <a:cs typeface="Calibri" panose="020F0502020204030204" pitchFamily="34" charset="0"/>
+              </a:defRPr>
+            </a:lvl1pPr>
+          </a:lstStyle>
+          <a:p>
+            <a:r>
+              <a:rPr lang="en-US" dirty="0"/>
+              <a:t>Click to edit Master title style</a:t>
+            </a:r>
+          </a:p>
+        </p:txBody>
+      </p:sp>
+      <p:sp>
+        <p:nvSpPr>
+          <p:cNvPr id="3" name="Subtitle 2"/>
+          <p:cNvSpPr>
+            <a:spLocks noGrp="1"/>
+          </p:cNvSpPr>
+          <p:nvPr>
+            <p:ph type="subTitle" idx="1"/>
+          </p:nvPr>
+        </p:nvSpPr>
+        <p:spPr>
+          <a:xfrm>
+            <a:off x="356616" y="3810416"/>
+            <a:ext cx="6601232" cy="356616"/>
+          </a:xfrm>
+        </p:spPr>
+        <p:txBody>
+          <a:bodyPr anchor="b">
+            <a:noAutofit/>
+          </a:bodyPr>
+          <a:lstStyle>
+            <a:lvl1pPr marL="0" indent="0" algn="l">
+              <a:buNone/>
+              <a:defRPr sz="2000">
+                <a:solidFill>
+                  <a:schemeClr val="bg1">
+                    <a:lumMod val="85000"/>
+                  </a:schemeClr>
+                </a:solidFill>
+              </a:defRPr>
+            </a:lvl1pPr>
+            <a:lvl2pPr marL="502920" indent="0" algn="ctr">
+              <a:buNone/>
+              <a:defRPr sz="2200"/>
+            </a:lvl2pPr>
+            <a:lvl3pPr marL="1005840" indent="0" algn="ctr">
+              <a:buNone/>
+              <a:defRPr sz="1980"/>
+            </a:lvl3pPr>
+            <a:lvl4pPr marL="1508760" indent="0" algn="ctr">
+              <a:buNone/>
+              <a:defRPr sz="1760"/>
+            </a:lvl4pPr>
+            <a:lvl5pPr marL="2011680" indent="0" algn="ctr">
+              <a:buNone/>
+              <a:defRPr sz="1760"/>
+            </a:lvl5pPr>
+            <a:lvl6pPr marL="2514600" indent="0" algn="ctr">
+              <a:buNone/>
+              <a:defRPr sz="1760"/>
+            </a:lvl6pPr>
+            <a:lvl7pPr marL="3017520" indent="0" algn="ctr">
+              <a:buNone/>
+              <a:defRPr sz="1760"/>
+            </a:lvl7pPr>
+            <a:lvl8pPr marL="3520440" indent="0" algn="ctr">
+              <a:buNone/>
+              <a:defRPr sz="1760"/>
+            </a:lvl8pPr>
+            <a:lvl9pPr marL="4023360" indent="0" algn="ctr">
+              <a:buNone/>
+              <a:defRPr sz="1760"/>
+            </a:lvl9pPr>
+          </a:lstStyle>
+          <a:p>
+            <a:r>
+              <a:rPr lang="en-US" dirty="0"/>
+              <a:t>Click to edit Master subtitle style</a:t>
+            </a:r>
+          </a:p>
+        </p:txBody>
+      </p:sp>
       <p:pic>
         <p:nvPicPr>
           <p:cNvPr id="8" name="Picture 7">
@@ -1052,8 +1384,8 @@
         </p:blipFill>
         <p:spPr bwMode="auto">
           <a:xfrm>
-            <a:off x="7430799" y="6300216"/>
-            <a:ext cx="2214080" cy="1208790"/>
+            <a:off x="7606215" y="6415790"/>
+            <a:ext cx="2038664" cy="1113020"/>
           </a:xfrm>
           <a:prstGeom prst="rect">
             <a:avLst/>
@@ -1080,58 +1412,36 @@
             <p:ph type="dt" sz="half" idx="10"/>
           </p:nvPr>
         </p:nvSpPr>
-        <p:spPr/>
-        <p:txBody>
-          <a:bodyPr/>
-          <a:lstStyle/>
-          <a:p>
-            <a:fld id="{B35CD269-42B5-4067-A42B-F772DEB587E1}" type="datetimeFigureOut">
+        <p:spPr>
+          <a:xfrm>
+            <a:off x="356616" y="4120525"/>
+            <a:ext cx="2265283" cy="356616"/>
+          </a:xfrm>
+          <a:prstGeom prst="rect">
+            <a:avLst/>
+          </a:prstGeom>
+        </p:spPr>
+        <p:txBody>
+          <a:bodyPr anchor="t"/>
+          <a:lstStyle>
+            <a:lvl1pPr algn="l">
+              <a:defRPr sz="2000">
+                <a:solidFill>
+                  <a:schemeClr val="bg1">
+                    <a:lumMod val="85000"/>
+                  </a:schemeClr>
+                </a:solidFill>
+                <a:latin typeface="Calibri" panose="020F0502020204030204" pitchFamily="34" charset="0"/>
+                <a:cs typeface="Calibri" panose="020F0502020204030204" pitchFamily="34" charset="0"/>
+              </a:defRPr>
+            </a:lvl1pPr>
+          </a:lstStyle>
+          <a:p>
+            <a:fld id="{DA2CBBD1-0BD6-7B4F-AC90-15CD32335A31}" type="datetime4">
               <a:rPr lang="en-US" smtClean="0"/>
-              <a:t>6/28/23</a:t>
+              <a:t>July 5, 2023</a:t>
             </a:fld>
-            <a:endParaRPr lang="en-US"/>
-          </a:p>
-        </p:txBody>
-      </p:sp>
-      <p:sp>
-        <p:nvSpPr>
-          <p:cNvPr id="5" name="Footer Placeholder 4"/>
-          <p:cNvSpPr>
-            <a:spLocks noGrp="1"/>
-          </p:cNvSpPr>
-          <p:nvPr>
-            <p:ph type="ftr" sz="quarter" idx="11"/>
-          </p:nvPr>
-        </p:nvSpPr>
-        <p:spPr/>
-        <p:txBody>
-          <a:bodyPr/>
-          <a:lstStyle/>
-          <a:p>
-            <a:endParaRPr lang="en-US"/>
-          </a:p>
-        </p:txBody>
-      </p:sp>
-      <p:sp>
-        <p:nvSpPr>
-          <p:cNvPr id="6" name="Slide Number Placeholder 5"/>
-          <p:cNvSpPr>
-            <a:spLocks noGrp="1"/>
-          </p:cNvSpPr>
-          <p:nvPr>
-            <p:ph type="sldNum" sz="quarter" idx="12"/>
-          </p:nvPr>
-        </p:nvSpPr>
-        <p:spPr/>
-        <p:txBody>
-          <a:bodyPr/>
-          <a:lstStyle/>
-          <a:p>
-            <a:fld id="{141F55E9-9A83-45A8-A91F-A02EDC2352D1}" type="slidenum">
-              <a:rPr lang="en-US" smtClean="0"/>
-              <a:t>‹#›</a:t>
-            </a:fld>
-            <a:endParaRPr lang="en-US"/>
+            <a:endParaRPr lang="en-US" dirty="0"/>
           </a:p>
         </p:txBody>
       </p:sp>
@@ -1184,7 +1494,6 @@
               <a:rPr lang="en-US"/>
               <a:t>Click to edit Master title style</a:t>
             </a:r>
-            <a:endParaRPr lang="en-US" dirty="0"/>
           </a:p>
         </p:txBody>
       </p:sp>
@@ -1236,7 +1545,6 @@
               <a:rPr lang="en-US"/>
               <a:t>Fifth level</a:t>
             </a:r>
-            <a:endParaRPr lang="en-US" dirty="0"/>
           </a:p>
         </p:txBody>
       </p:sp>
@@ -1255,9 +1563,9 @@
           <a:bodyPr/>
           <a:lstStyle/>
           <a:p>
-            <a:fld id="{B35CD269-42B5-4067-A42B-F772DEB587E1}" type="datetimeFigureOut">
+            <a:fld id="{241EB5C9-1307-BA42-ABA2-0BC069CD8E7F}" type="datetimeFigureOut">
               <a:rPr lang="en-US" smtClean="0"/>
-              <a:t>6/28/23</a:t>
+              <a:t>1/2/22</a:t>
             </a:fld>
             <a:endParaRPr lang="en-US"/>
           </a:p>
@@ -1297,7 +1605,7 @@
           <a:bodyPr/>
           <a:lstStyle/>
           <a:p>
-            <a:fld id="{141F55E9-9A83-45A8-A91F-A02EDC2352D1}" type="slidenum">
+            <a:fld id="{C5EF2332-01BF-834F-8236-50238282D533}" type="slidenum">
               <a:rPr lang="en-US" smtClean="0"/>
               <a:t>‹#›</a:t>
             </a:fld>
@@ -1305,87 +1613,10 @@
           </a:p>
         </p:txBody>
       </p:sp>
-      <p:cxnSp>
-        <p:nvCxnSpPr>
-          <p:cNvPr id="7" name="Straight Connector 6">
-            <a:extLst>
-              <a:ext uri="{FF2B5EF4-FFF2-40B4-BE49-F238E27FC236}">
-                <a16:creationId xmlns:a16="http://schemas.microsoft.com/office/drawing/2014/main" id="{0B38BA5A-92F2-C5FD-B121-DC4F26ED4687}"/>
-              </a:ext>
-            </a:extLst>
-          </p:cNvPr>
-          <p:cNvCxnSpPr/>
-          <p:nvPr userDrawn="1"/>
-        </p:nvCxnSpPr>
-        <p:spPr>
-          <a:xfrm>
-            <a:off x="356616" y="976256"/>
-            <a:ext cx="9345168" cy="0"/>
-          </a:xfrm>
-          <a:prstGeom prst="line">
-            <a:avLst/>
-          </a:prstGeom>
-          <a:ln w="19050">
-            <a:solidFill>
-              <a:schemeClr val="tx1"/>
-            </a:solidFill>
-          </a:ln>
-        </p:spPr>
-        <p:style>
-          <a:lnRef idx="1">
-            <a:schemeClr val="dk1"/>
-          </a:lnRef>
-          <a:fillRef idx="0">
-            <a:schemeClr val="dk1"/>
-          </a:fillRef>
-          <a:effectRef idx="0">
-            <a:schemeClr val="dk1"/>
-          </a:effectRef>
-          <a:fontRef idx="minor">
-            <a:schemeClr val="tx1"/>
-          </a:fontRef>
-        </p:style>
-      </p:cxnSp>
-      <p:pic>
-        <p:nvPicPr>
-          <p:cNvPr id="8" name="Picture 7">
-            <a:extLst>
-              <a:ext uri="{FF2B5EF4-FFF2-40B4-BE49-F238E27FC236}">
-                <a16:creationId xmlns:a16="http://schemas.microsoft.com/office/drawing/2014/main" id="{1DD45F37-D8D0-420B-F29B-C8B18ABD57D8}"/>
-              </a:ext>
-            </a:extLst>
-          </p:cNvPr>
-          <p:cNvPicPr>
-            <a:picLocks noChangeAspect="1"/>
-          </p:cNvPicPr>
-          <p:nvPr userDrawn="1"/>
-        </p:nvPicPr>
-        <p:blipFill>
-          <a:blip r:embed="rId2">
-            <a:extLst>
-              <a:ext uri="{28A0092B-C50C-407E-A947-70E740481C1C}">
-                <a14:useLocalDpi xmlns:a14="http://schemas.microsoft.com/office/drawing/2010/main" val="0"/>
-              </a:ext>
-            </a:extLst>
-          </a:blip>
-          <a:stretch>
-            <a:fillRect/>
-          </a:stretch>
-        </p:blipFill>
-        <p:spPr>
-          <a:xfrm>
-            <a:off x="8357622" y="346127"/>
-            <a:ext cx="1370585" cy="337252"/>
-          </a:xfrm>
-          <a:prstGeom prst="rect">
-            <a:avLst/>
-          </a:prstGeom>
-        </p:spPr>
-      </p:pic>
     </p:spTree>
     <p:extLst>
       <p:ext uri="{BB962C8B-B14F-4D97-AF65-F5344CB8AC3E}">
-        <p14:creationId xmlns:p14="http://schemas.microsoft.com/office/powerpoint/2010/main" val="3513375297"/>
+        <p14:creationId xmlns:p14="http://schemas.microsoft.com/office/powerpoint/2010/main" val="313914798"/>
       </p:ext>
     </p:extLst>
   </p:cSld>
@@ -1424,8 +1655,8 @@
         </p:nvSpPr>
         <p:spPr>
           <a:xfrm>
-            <a:off x="7204860" y="401637"/>
-            <a:ext cx="2170896" cy="6393022"/>
+            <a:off x="6629400" y="205979"/>
+            <a:ext cx="2057400" cy="4388644"/>
           </a:xfrm>
         </p:spPr>
         <p:txBody>
@@ -1436,7 +1667,6 @@
               <a:rPr lang="en-US"/>
               <a:t>Click to edit Master title style</a:t>
             </a:r>
-            <a:endParaRPr lang="en-US" dirty="0"/>
           </a:p>
         </p:txBody>
       </p:sp>
@@ -1452,8 +1682,8 @@
         </p:nvSpPr>
         <p:spPr>
           <a:xfrm>
-            <a:off x="692170" y="401637"/>
-            <a:ext cx="6386840" cy="6393022"/>
+            <a:off x="457200" y="205979"/>
+            <a:ext cx="6019800" cy="4388644"/>
           </a:xfrm>
         </p:spPr>
         <p:txBody>
@@ -1493,7 +1723,6 @@
               <a:rPr lang="en-US"/>
               <a:t>Fifth level</a:t>
             </a:r>
-            <a:endParaRPr lang="en-US" dirty="0"/>
           </a:p>
         </p:txBody>
       </p:sp>
@@ -1512,9 +1741,9 @@
           <a:bodyPr/>
           <a:lstStyle/>
           <a:p>
-            <a:fld id="{B35CD269-42B5-4067-A42B-F772DEB587E1}" type="datetimeFigureOut">
+            <a:fld id="{241EB5C9-1307-BA42-ABA2-0BC069CD8E7F}" type="datetimeFigureOut">
               <a:rPr lang="en-US" smtClean="0"/>
-              <a:t>6/28/23</a:t>
+              <a:t>1/2/22</a:t>
             </a:fld>
             <a:endParaRPr lang="en-US"/>
           </a:p>
@@ -1554,7 +1783,7 @@
           <a:bodyPr/>
           <a:lstStyle/>
           <a:p>
-            <a:fld id="{141F55E9-9A83-45A8-A91F-A02EDC2352D1}" type="slidenum">
+            <a:fld id="{C5EF2332-01BF-834F-8236-50238282D533}" type="slidenum">
               <a:rPr lang="en-US" smtClean="0"/>
               <a:t>‹#›</a:t>
             </a:fld>
@@ -1565,7 +1794,7 @@
     </p:spTree>
     <p:extLst>
       <p:ext uri="{BB962C8B-B14F-4D97-AF65-F5344CB8AC3E}">
-        <p14:creationId xmlns:p14="http://schemas.microsoft.com/office/powerpoint/2010/main" val="4033015783"/>
+        <p14:creationId xmlns:p14="http://schemas.microsoft.com/office/powerpoint/2010/main" val="2581529045"/>
       </p:ext>
     </p:extLst>
   </p:cSld>
@@ -1631,80 +1860,37 @@
           <a:p>
             <a:pPr lvl="0"/>
             <a:r>
-              <a:rPr lang="en-US"/>
+              <a:rPr lang="en-US" dirty="0"/>
               <a:t>Click to edit Master text styles</a:t>
             </a:r>
           </a:p>
           <a:p>
             <a:pPr lvl="1"/>
             <a:r>
-              <a:rPr lang="en-US"/>
+              <a:rPr lang="en-US" dirty="0"/>
               <a:t>Second level</a:t>
             </a:r>
           </a:p>
           <a:p>
             <a:pPr lvl="2"/>
             <a:r>
-              <a:rPr lang="en-US"/>
+              <a:rPr lang="en-US" dirty="0"/>
               <a:t>Third level</a:t>
             </a:r>
           </a:p>
           <a:p>
             <a:pPr lvl="3"/>
             <a:r>
-              <a:rPr lang="en-US"/>
+              <a:rPr lang="en-US" dirty="0"/>
               <a:t>Fourth level</a:t>
             </a:r>
           </a:p>
           <a:p>
             <a:pPr lvl="4"/>
             <a:r>
-              <a:rPr lang="en-US"/>
+              <a:rPr lang="en-US" dirty="0"/>
               <a:t>Fifth level</a:t>
             </a:r>
-            <a:endParaRPr lang="en-US" dirty="0"/>
-          </a:p>
-        </p:txBody>
-      </p:sp>
-      <p:sp>
-        <p:nvSpPr>
-          <p:cNvPr id="4" name="Date Placeholder 3"/>
-          <p:cNvSpPr>
-            <a:spLocks noGrp="1"/>
-          </p:cNvSpPr>
-          <p:nvPr>
-            <p:ph type="dt" sz="half" idx="10"/>
-          </p:nvPr>
-        </p:nvSpPr>
-        <p:spPr/>
-        <p:txBody>
-          <a:bodyPr/>
-          <a:lstStyle/>
-          <a:p>
-            <a:fld id="{B35CD269-42B5-4067-A42B-F772DEB587E1}" type="datetimeFigureOut">
-              <a:rPr lang="en-US" smtClean="0"/>
-              <a:t>6/28/23</a:t>
-            </a:fld>
-            <a:endParaRPr lang="en-US"/>
-          </a:p>
-        </p:txBody>
-      </p:sp>
-      <p:sp>
-        <p:nvSpPr>
-          <p:cNvPr id="5" name="Footer Placeholder 4"/>
-          <p:cNvSpPr>
-            <a:spLocks noGrp="1"/>
-          </p:cNvSpPr>
-          <p:nvPr>
-            <p:ph type="ftr" sz="quarter" idx="11"/>
-          </p:nvPr>
-        </p:nvSpPr>
-        <p:spPr/>
-        <p:txBody>
-          <a:bodyPr/>
-          <a:lstStyle/>
-          <a:p>
-            <a:endParaRPr lang="en-US"/>
           </a:p>
         </p:txBody>
       </p:sp>
@@ -1840,6 +2026,51 @@
           </a:prstGeom>
         </p:spPr>
       </p:pic>
+      <p:sp>
+        <p:nvSpPr>
+          <p:cNvPr id="10" name="Footer Placeholder 4">
+            <a:extLst>
+              <a:ext uri="{FF2B5EF4-FFF2-40B4-BE49-F238E27FC236}">
+                <a16:creationId xmlns:a16="http://schemas.microsoft.com/office/drawing/2014/main" id="{A067A761-BDC4-350D-AB75-58BCC49CA6D6}"/>
+              </a:ext>
+            </a:extLst>
+          </p:cNvPr>
+          <p:cNvSpPr>
+            <a:spLocks noGrp="1"/>
+          </p:cNvSpPr>
+          <p:nvPr>
+            <p:ph type="ftr" sz="quarter" idx="3"/>
+          </p:nvPr>
+        </p:nvSpPr>
+        <p:spPr>
+          <a:xfrm>
+            <a:off x="3335000" y="7187184"/>
+            <a:ext cx="3397925" cy="182880"/>
+          </a:xfrm>
+          <a:prstGeom prst="rect">
+            <a:avLst/>
+          </a:prstGeom>
+        </p:spPr>
+        <p:txBody>
+          <a:bodyPr vert="horz" lIns="91440" tIns="45720" rIns="91440" bIns="45720" rtlCol="0" anchor="ctr"/>
+          <a:lstStyle>
+            <a:lvl1pPr algn="ctr">
+              <a:defRPr sz="1000">
+                <a:solidFill>
+                  <a:schemeClr val="tx1">
+                    <a:tint val="75000"/>
+                  </a:schemeClr>
+                </a:solidFill>
+                <a:latin typeface="Calibri" panose="020F0502020204030204" pitchFamily="34" charset="0"/>
+                <a:cs typeface="Calibri" panose="020F0502020204030204" pitchFamily="34" charset="0"/>
+              </a:defRPr>
+            </a:lvl1pPr>
+          </a:lstStyle>
+          <a:p>
+            <a:endParaRPr lang="en-US" dirty="0"/>
+          </a:p>
+        </p:txBody>
+      </p:sp>
     </p:spTree>
     <p:extLst>
       <p:ext uri="{BB962C8B-B14F-4D97-AF65-F5344CB8AC3E}">
@@ -1854,7 +2085,7 @@
 </file>
 
 <file path=ppt/slideLayouts/slideLayout3.xml><?xml version="1.0" encoding="utf-8"?>
-<p:sldLayout xmlns:a="http://schemas.openxmlformats.org/drawingml/2006/main" xmlns:r="http://schemas.openxmlformats.org/officeDocument/2006/relationships" xmlns:p="http://schemas.openxmlformats.org/presentationml/2006/main" type="secHead" preserve="1">
+<p:sldLayout xmlns:a="http://schemas.openxmlformats.org/drawingml/2006/main" xmlns:r="http://schemas.openxmlformats.org/officeDocument/2006/relationships" xmlns:p="http://schemas.openxmlformats.org/presentationml/2006/main" preserve="1" userDrawn="1">
   <p:cSld name="Section Header">
     <p:spTree>
       <p:nvGrpSpPr>
@@ -1870,217 +2101,164 @@
           <a:chExt cx="0" cy="0"/>
         </a:xfrm>
       </p:grpSpPr>
-      <p:sp>
-        <p:nvSpPr>
-          <p:cNvPr id="2" name="Title 1"/>
-          <p:cNvSpPr>
-            <a:spLocks noGrp="1"/>
-          </p:cNvSpPr>
-          <p:nvPr>
-            <p:ph type="title"/>
-          </p:nvPr>
-        </p:nvSpPr>
+      <p:pic>
+        <p:nvPicPr>
+          <p:cNvPr id="7" name="Picture 6">
+            <a:extLst>
+              <a:ext uri="{FF2B5EF4-FFF2-40B4-BE49-F238E27FC236}">
+                <a16:creationId xmlns:a16="http://schemas.microsoft.com/office/drawing/2014/main" id="{82A55E60-FD00-32E6-E272-1DEED47CD015}"/>
+              </a:ext>
+            </a:extLst>
+          </p:cNvPr>
+          <p:cNvPicPr>
+            <a:picLocks/>
+          </p:cNvPicPr>
+          <p:nvPr userDrawn="1"/>
+        </p:nvPicPr>
+        <p:blipFill>
+          <a:blip r:embed="rId2">
+            <a:extLst>
+              <a:ext uri="{28A0092B-C50C-407E-A947-70E740481C1C}">
+                <a14:useLocalDpi xmlns:a14="http://schemas.microsoft.com/office/drawing/2010/main" val="0"/>
+              </a:ext>
+            </a:extLst>
+          </a:blip>
+          <a:stretch>
+            <a:fillRect/>
+          </a:stretch>
+        </p:blipFill>
         <p:spPr>
           <a:xfrm>
-            <a:off x="686927" y="1880713"/>
-            <a:ext cx="8683585" cy="3138011"/>
-          </a:xfrm>
-        </p:spPr>
-        <p:txBody>
-          <a:bodyPr anchor="b"/>
+            <a:off x="0" y="4882896"/>
+            <a:ext cx="10067544" cy="1161288"/>
+          </a:xfrm>
+          <a:prstGeom prst="rect">
+            <a:avLst/>
+          </a:prstGeom>
+        </p:spPr>
+      </p:pic>
+      <p:pic>
+        <p:nvPicPr>
+          <p:cNvPr id="8" name="Picture 7">
+            <a:extLst>
+              <a:ext uri="{FF2B5EF4-FFF2-40B4-BE49-F238E27FC236}">
+                <a16:creationId xmlns:a16="http://schemas.microsoft.com/office/drawing/2014/main" id="{6944175D-7FB0-B827-2BA8-40C98554F0EE}"/>
+              </a:ext>
+            </a:extLst>
+          </p:cNvPr>
+          <p:cNvPicPr>
+            <a:picLocks noChangeAspect="1"/>
+          </p:cNvPicPr>
+          <p:nvPr userDrawn="1"/>
+        </p:nvPicPr>
+        <p:blipFill>
+          <a:blip r:embed="rId3">
+            <a:extLst>
+              <a:ext uri="{28A0092B-C50C-407E-A947-70E740481C1C}">
+                <a14:useLocalDpi xmlns:a14="http://schemas.microsoft.com/office/drawing/2010/main" val="0"/>
+              </a:ext>
+            </a:extLst>
+          </a:blip>
+          <a:stretch>
+            <a:fillRect/>
+          </a:stretch>
+        </p:blipFill>
+        <p:spPr>
+          <a:xfrm>
+            <a:off x="356616" y="6665976"/>
+            <a:ext cx="2081015" cy="512064"/>
+          </a:xfrm>
+          <a:prstGeom prst="rect">
+            <a:avLst/>
+          </a:prstGeom>
+        </p:spPr>
+      </p:pic>
+      <p:pic>
+        <p:nvPicPr>
+          <p:cNvPr id="9" name="Picture 8" descr="VCU Logo">
+            <a:extLst>
+              <a:ext uri="{FF2B5EF4-FFF2-40B4-BE49-F238E27FC236}">
+                <a16:creationId xmlns:a16="http://schemas.microsoft.com/office/drawing/2014/main" id="{AD979F55-D34A-AA3B-E229-8E878BA11C2B}"/>
+              </a:ext>
+            </a:extLst>
+          </p:cNvPr>
+          <p:cNvPicPr>
+            <a:picLocks noChangeAspect="1" noChangeArrowheads="1"/>
+          </p:cNvPicPr>
+          <p:nvPr userDrawn="1"/>
+        </p:nvPicPr>
+        <p:blipFill>
+          <a:blip r:embed="rId4">
+            <a:extLst>
+              <a:ext uri="{28A0092B-C50C-407E-A947-70E740481C1C}">
+                <a14:useLocalDpi xmlns:a14="http://schemas.microsoft.com/office/drawing/2010/main" val="0"/>
+              </a:ext>
+            </a:extLst>
+          </a:blip>
+          <a:srcRect/>
+          <a:stretch>
+            <a:fillRect/>
+          </a:stretch>
+        </p:blipFill>
+        <p:spPr bwMode="auto">
+          <a:xfrm>
+            <a:off x="7430799" y="6326094"/>
+            <a:ext cx="2214080" cy="1208790"/>
+          </a:xfrm>
+          <a:prstGeom prst="rect">
+            <a:avLst/>
+          </a:prstGeom>
+          <a:noFill/>
+          <a:extLst>
+            <a:ext uri="{909E8E84-426E-40DD-AFC4-6F175D3DCCD1}">
+              <a14:hiddenFill xmlns:a14="http://schemas.microsoft.com/office/drawing/2010/main">
+                <a:solidFill>
+                  <a:srgbClr val="FFFFFF"/>
+                </a:solidFill>
+              </a14:hiddenFill>
+            </a:ext>
+          </a:extLst>
+        </p:spPr>
+      </p:pic>
+      <p:sp>
+        <p:nvSpPr>
+          <p:cNvPr id="12" name="Title 1">
+            <a:extLst>
+              <a:ext uri="{FF2B5EF4-FFF2-40B4-BE49-F238E27FC236}">
+                <a16:creationId xmlns:a16="http://schemas.microsoft.com/office/drawing/2014/main" id="{F813C0F5-0D35-693F-D383-750FEB585D56}"/>
+              </a:ext>
+            </a:extLst>
+          </p:cNvPr>
+          <p:cNvSpPr>
+            <a:spLocks noGrp="1"/>
+          </p:cNvSpPr>
+          <p:nvPr>
+            <p:ph type="ctrTitle"/>
+          </p:nvPr>
+        </p:nvSpPr>
+        <p:spPr>
+          <a:xfrm>
+            <a:off x="356616" y="3956065"/>
+            <a:ext cx="6601968" cy="722376"/>
+          </a:xfrm>
+        </p:spPr>
+        <p:txBody>
+          <a:bodyPr anchor="b">
+            <a:noAutofit/>
+          </a:bodyPr>
           <a:lstStyle>
-            <a:lvl1pPr>
-              <a:defRPr sz="6600"/>
+            <a:lvl1pPr algn="l">
+              <a:defRPr sz="4000" b="1">
+                <a:latin typeface="Calibri" panose="020F0502020204030204" pitchFamily="34" charset="0"/>
+                <a:cs typeface="Calibri" panose="020F0502020204030204" pitchFamily="34" charset="0"/>
+              </a:defRPr>
             </a:lvl1pPr>
           </a:lstStyle>
           <a:p>
             <a:r>
-              <a:rPr lang="en-US"/>
+              <a:rPr lang="en-US" dirty="0"/>
               <a:t>Click to edit Master title style</a:t>
             </a:r>
-            <a:endParaRPr lang="en-US" dirty="0"/>
-          </a:p>
-        </p:txBody>
-      </p:sp>
-      <p:sp>
-        <p:nvSpPr>
-          <p:cNvPr id="3" name="Text Placeholder 2"/>
-          <p:cNvSpPr>
-            <a:spLocks noGrp="1"/>
-          </p:cNvSpPr>
-          <p:nvPr>
-            <p:ph type="body" idx="1"/>
-          </p:nvPr>
-        </p:nvSpPr>
-        <p:spPr>
-          <a:xfrm>
-            <a:off x="686927" y="5048411"/>
-            <a:ext cx="8683585" cy="1650206"/>
-          </a:xfrm>
-        </p:spPr>
-        <p:txBody>
-          <a:bodyPr/>
-          <a:lstStyle>
-            <a:lvl1pPr marL="0" indent="0">
-              <a:buNone/>
-              <a:defRPr sz="2640">
-                <a:solidFill>
-                  <a:schemeClr val="tx1"/>
-                </a:solidFill>
-              </a:defRPr>
-            </a:lvl1pPr>
-            <a:lvl2pPr marL="502920" indent="0">
-              <a:buNone/>
-              <a:defRPr sz="2200">
-                <a:solidFill>
-                  <a:schemeClr val="tx1">
-                    <a:tint val="75000"/>
-                  </a:schemeClr>
-                </a:solidFill>
-              </a:defRPr>
-            </a:lvl2pPr>
-            <a:lvl3pPr marL="1005840" indent="0">
-              <a:buNone/>
-              <a:defRPr sz="1980">
-                <a:solidFill>
-                  <a:schemeClr val="tx1">
-                    <a:tint val="75000"/>
-                  </a:schemeClr>
-                </a:solidFill>
-              </a:defRPr>
-            </a:lvl3pPr>
-            <a:lvl4pPr marL="1508760" indent="0">
-              <a:buNone/>
-              <a:defRPr sz="1760">
-                <a:solidFill>
-                  <a:schemeClr val="tx1">
-                    <a:tint val="75000"/>
-                  </a:schemeClr>
-                </a:solidFill>
-              </a:defRPr>
-            </a:lvl4pPr>
-            <a:lvl5pPr marL="2011680" indent="0">
-              <a:buNone/>
-              <a:defRPr sz="1760">
-                <a:solidFill>
-                  <a:schemeClr val="tx1">
-                    <a:tint val="75000"/>
-                  </a:schemeClr>
-                </a:solidFill>
-              </a:defRPr>
-            </a:lvl5pPr>
-            <a:lvl6pPr marL="2514600" indent="0">
-              <a:buNone/>
-              <a:defRPr sz="1760">
-                <a:solidFill>
-                  <a:schemeClr val="tx1">
-                    <a:tint val="75000"/>
-                  </a:schemeClr>
-                </a:solidFill>
-              </a:defRPr>
-            </a:lvl6pPr>
-            <a:lvl7pPr marL="3017520" indent="0">
-              <a:buNone/>
-              <a:defRPr sz="1760">
-                <a:solidFill>
-                  <a:schemeClr val="tx1">
-                    <a:tint val="75000"/>
-                  </a:schemeClr>
-                </a:solidFill>
-              </a:defRPr>
-            </a:lvl7pPr>
-            <a:lvl8pPr marL="3520440" indent="0">
-              <a:buNone/>
-              <a:defRPr sz="1760">
-                <a:solidFill>
-                  <a:schemeClr val="tx1">
-                    <a:tint val="75000"/>
-                  </a:schemeClr>
-                </a:solidFill>
-              </a:defRPr>
-            </a:lvl8pPr>
-            <a:lvl9pPr marL="4023360" indent="0">
-              <a:buNone/>
-              <a:defRPr sz="1760">
-                <a:solidFill>
-                  <a:schemeClr val="tx1">
-                    <a:tint val="75000"/>
-                  </a:schemeClr>
-                </a:solidFill>
-              </a:defRPr>
-            </a:lvl9pPr>
-          </a:lstStyle>
-          <a:p>
-            <a:pPr lvl="0"/>
-            <a:r>
-              <a:rPr lang="en-US"/>
-              <a:t>Click to edit Master text styles</a:t>
-            </a:r>
-          </a:p>
-        </p:txBody>
-      </p:sp>
-      <p:sp>
-        <p:nvSpPr>
-          <p:cNvPr id="4" name="Date Placeholder 3"/>
-          <p:cNvSpPr>
-            <a:spLocks noGrp="1"/>
-          </p:cNvSpPr>
-          <p:nvPr>
-            <p:ph type="dt" sz="half" idx="10"/>
-          </p:nvPr>
-        </p:nvSpPr>
-        <p:spPr/>
-        <p:txBody>
-          <a:bodyPr/>
-          <a:lstStyle/>
-          <a:p>
-            <a:fld id="{B35CD269-42B5-4067-A42B-F772DEB587E1}" type="datetimeFigureOut">
-              <a:rPr lang="en-US" smtClean="0"/>
-              <a:t>6/28/23</a:t>
-            </a:fld>
-            <a:endParaRPr lang="en-US"/>
-          </a:p>
-        </p:txBody>
-      </p:sp>
-      <p:sp>
-        <p:nvSpPr>
-          <p:cNvPr id="5" name="Footer Placeholder 4"/>
-          <p:cNvSpPr>
-            <a:spLocks noGrp="1"/>
-          </p:cNvSpPr>
-          <p:nvPr>
-            <p:ph type="ftr" sz="quarter" idx="11"/>
-          </p:nvPr>
-        </p:nvSpPr>
-        <p:spPr/>
-        <p:txBody>
-          <a:bodyPr/>
-          <a:lstStyle/>
-          <a:p>
-            <a:endParaRPr lang="en-US"/>
-          </a:p>
-        </p:txBody>
-      </p:sp>
-      <p:sp>
-        <p:nvSpPr>
-          <p:cNvPr id="6" name="Slide Number Placeholder 5"/>
-          <p:cNvSpPr>
-            <a:spLocks noGrp="1"/>
-          </p:cNvSpPr>
-          <p:nvPr>
-            <p:ph type="sldNum" sz="quarter" idx="12"/>
-          </p:nvPr>
-        </p:nvSpPr>
-        <p:spPr/>
-        <p:txBody>
-          <a:bodyPr/>
-          <a:lstStyle/>
-          <a:p>
-            <a:fld id="{141F55E9-9A83-45A8-A91F-A02EDC2352D1}" type="slidenum">
-              <a:rPr lang="en-US" smtClean="0"/>
-              <a:t>‹#›</a:t>
-            </a:fld>
-            <a:endParaRPr lang="en-US"/>
           </a:p>
         </p:txBody>
       </p:sp>
@@ -2130,10 +2308,9 @@
           <a:lstStyle/>
           <a:p>
             <a:r>
-              <a:rPr lang="en-US"/>
+              <a:rPr lang="en-US" dirty="0"/>
               <a:t>Click to edit Master title style</a:t>
             </a:r>
-            <a:endParaRPr lang="en-US" dirty="0"/>
           </a:p>
         </p:txBody>
       </p:sp>
@@ -2159,6 +2336,62 @@
           <a:p>
             <a:pPr lvl="0"/>
             <a:r>
+              <a:rPr lang="en-US" dirty="0"/>
+              <a:t>Click to edit Master text styles</a:t>
+            </a:r>
+          </a:p>
+          <a:p>
+            <a:pPr lvl="1"/>
+            <a:r>
+              <a:rPr lang="en-US" dirty="0"/>
+              <a:t>Second level</a:t>
+            </a:r>
+          </a:p>
+          <a:p>
+            <a:pPr lvl="2"/>
+            <a:r>
+              <a:rPr lang="en-US" dirty="0"/>
+              <a:t>Third level</a:t>
+            </a:r>
+          </a:p>
+          <a:p>
+            <a:pPr lvl="3"/>
+            <a:r>
+              <a:rPr lang="en-US" dirty="0"/>
+              <a:t>Fourth level</a:t>
+            </a:r>
+          </a:p>
+          <a:p>
+            <a:pPr lvl="4"/>
+            <a:r>
+              <a:rPr lang="en-US" dirty="0"/>
+              <a:t>Fifth level</a:t>
+            </a:r>
+          </a:p>
+        </p:txBody>
+      </p:sp>
+      <p:sp>
+        <p:nvSpPr>
+          <p:cNvPr id="4" name="Content Placeholder 3"/>
+          <p:cNvSpPr>
+            <a:spLocks noGrp="1"/>
+          </p:cNvSpPr>
+          <p:nvPr>
+            <p:ph sz="half" idx="2"/>
+          </p:nvPr>
+        </p:nvSpPr>
+        <p:spPr>
+          <a:xfrm>
+            <a:off x="5202936" y="1371600"/>
+            <a:ext cx="4489704" cy="5266944"/>
+          </a:xfrm>
+        </p:spPr>
+        <p:txBody>
+          <a:bodyPr/>
+          <a:lstStyle/>
+          <a:p>
+            <a:pPr lvl="0"/>
+            <a:r>
               <a:rPr lang="en-US"/>
               <a:t>Click to edit Master text styles</a:t>
             </a:r>
@@ -2191,105 +2424,6 @@
               <a:t>Fifth level</a:t>
             </a:r>
             <a:endParaRPr lang="en-US" dirty="0"/>
-          </a:p>
-        </p:txBody>
-      </p:sp>
-      <p:sp>
-        <p:nvSpPr>
-          <p:cNvPr id="4" name="Content Placeholder 3"/>
-          <p:cNvSpPr>
-            <a:spLocks noGrp="1"/>
-          </p:cNvSpPr>
-          <p:nvPr>
-            <p:ph sz="half" idx="2"/>
-          </p:nvPr>
-        </p:nvSpPr>
-        <p:spPr>
-          <a:xfrm>
-            <a:off x="5202936" y="1371600"/>
-            <a:ext cx="4489704" cy="5266944"/>
-          </a:xfrm>
-        </p:spPr>
-        <p:txBody>
-          <a:bodyPr/>
-          <a:lstStyle/>
-          <a:p>
-            <a:pPr lvl="0"/>
-            <a:r>
-              <a:rPr lang="en-US"/>
-              <a:t>Click to edit Master text styles</a:t>
-            </a:r>
-          </a:p>
-          <a:p>
-            <a:pPr lvl="1"/>
-            <a:r>
-              <a:rPr lang="en-US"/>
-              <a:t>Second level</a:t>
-            </a:r>
-          </a:p>
-          <a:p>
-            <a:pPr lvl="2"/>
-            <a:r>
-              <a:rPr lang="en-US"/>
-              <a:t>Third level</a:t>
-            </a:r>
-          </a:p>
-          <a:p>
-            <a:pPr lvl="3"/>
-            <a:r>
-              <a:rPr lang="en-US"/>
-              <a:t>Fourth level</a:t>
-            </a:r>
-          </a:p>
-          <a:p>
-            <a:pPr lvl="4"/>
-            <a:r>
-              <a:rPr lang="en-US"/>
-              <a:t>Fifth level</a:t>
-            </a:r>
-            <a:endParaRPr lang="en-US" dirty="0"/>
-          </a:p>
-        </p:txBody>
-      </p:sp>
-      <p:sp>
-        <p:nvSpPr>
-          <p:cNvPr id="5" name="Date Placeholder 4"/>
-          <p:cNvSpPr>
-            <a:spLocks noGrp="1"/>
-          </p:cNvSpPr>
-          <p:nvPr>
-            <p:ph type="dt" sz="half" idx="10"/>
-          </p:nvPr>
-        </p:nvSpPr>
-        <p:spPr/>
-        <p:txBody>
-          <a:bodyPr/>
-          <a:lstStyle/>
-          <a:p>
-            <a:fld id="{B35CD269-42B5-4067-A42B-F772DEB587E1}" type="datetimeFigureOut">
-              <a:rPr lang="en-US" smtClean="0"/>
-              <a:t>6/28/23</a:t>
-            </a:fld>
-            <a:endParaRPr lang="en-US"/>
-          </a:p>
-        </p:txBody>
-      </p:sp>
-      <p:sp>
-        <p:nvSpPr>
-          <p:cNvPr id="6" name="Footer Placeholder 5"/>
-          <p:cNvSpPr>
-            <a:spLocks noGrp="1"/>
-          </p:cNvSpPr>
-          <p:nvPr>
-            <p:ph type="ftr" sz="quarter" idx="11"/>
-          </p:nvPr>
-        </p:nvSpPr>
-        <p:spPr/>
-        <p:txBody>
-          <a:bodyPr/>
-          <a:lstStyle/>
-          <a:p>
-            <a:endParaRPr lang="en-US"/>
           </a:p>
         </p:txBody>
       </p:sp>
@@ -2393,6 +2527,51 @@
           </a:prstGeom>
         </p:spPr>
       </p:pic>
+      <p:sp>
+        <p:nvSpPr>
+          <p:cNvPr id="12" name="Footer Placeholder 4">
+            <a:extLst>
+              <a:ext uri="{FF2B5EF4-FFF2-40B4-BE49-F238E27FC236}">
+                <a16:creationId xmlns:a16="http://schemas.microsoft.com/office/drawing/2014/main" id="{2B2572AF-A5F8-D0DB-F128-A6145322A39A}"/>
+              </a:ext>
+            </a:extLst>
+          </p:cNvPr>
+          <p:cNvSpPr>
+            <a:spLocks noGrp="1"/>
+          </p:cNvSpPr>
+          <p:nvPr>
+            <p:ph type="ftr" sz="quarter" idx="3"/>
+          </p:nvPr>
+        </p:nvSpPr>
+        <p:spPr>
+          <a:xfrm>
+            <a:off x="3335000" y="7187184"/>
+            <a:ext cx="3397925" cy="182880"/>
+          </a:xfrm>
+          <a:prstGeom prst="rect">
+            <a:avLst/>
+          </a:prstGeom>
+        </p:spPr>
+        <p:txBody>
+          <a:bodyPr vert="horz" lIns="91440" tIns="45720" rIns="91440" bIns="45720" rtlCol="0" anchor="ctr"/>
+          <a:lstStyle>
+            <a:lvl1pPr algn="ctr">
+              <a:defRPr sz="1000">
+                <a:solidFill>
+                  <a:schemeClr val="tx1">
+                    <a:tint val="75000"/>
+                  </a:schemeClr>
+                </a:solidFill>
+                <a:latin typeface="Calibri" panose="020F0502020204030204" pitchFamily="34" charset="0"/>
+                <a:cs typeface="Calibri" panose="020F0502020204030204" pitchFamily="34" charset="0"/>
+              </a:defRPr>
+            </a:lvl1pPr>
+          </a:lstStyle>
+          <a:p>
+            <a:endParaRPr lang="en-US" dirty="0"/>
+          </a:p>
+        </p:txBody>
+      </p:sp>
     </p:spTree>
     <p:extLst>
       <p:ext uri="{BB962C8B-B14F-4D97-AF65-F5344CB8AC3E}">
@@ -2407,7 +2586,7 @@
 </file>
 
 <file path=ppt/slideLayouts/slideLayout5.xml><?xml version="1.0" encoding="utf-8"?>
-<p:sldLayout xmlns:a="http://schemas.openxmlformats.org/drawingml/2006/main" xmlns:r="http://schemas.openxmlformats.org/officeDocument/2006/relationships" xmlns:p="http://schemas.openxmlformats.org/presentationml/2006/main" type="twoTxTwoObj" preserve="1">
+<p:sldLayout xmlns:a="http://schemas.openxmlformats.org/drawingml/2006/main" xmlns:r="http://schemas.openxmlformats.org/officeDocument/2006/relationships" xmlns:p="http://schemas.openxmlformats.org/presentationml/2006/main" preserve="1" userDrawn="1">
   <p:cSld name="Comparison">
     <p:spTree>
       <p:nvGrpSpPr>
@@ -2435,19 +2614,18 @@
         </p:nvSpPr>
         <p:spPr>
           <a:xfrm>
-            <a:off x="693481" y="401639"/>
-            <a:ext cx="8683585" cy="1458119"/>
-          </a:xfrm>
-        </p:spPr>
-        <p:txBody>
-          <a:bodyPr/>
-          <a:lstStyle/>
-          <a:p>
-            <a:r>
-              <a:rPr lang="en-US"/>
+            <a:off x="356616" y="356616"/>
+            <a:ext cx="7543800" cy="356616"/>
+          </a:xfrm>
+        </p:spPr>
+        <p:txBody>
+          <a:bodyPr/>
+          <a:lstStyle/>
+          <a:p>
+            <a:r>
+              <a:rPr lang="en-US" dirty="0"/>
               <a:t>Click to edit Master title style</a:t>
             </a:r>
-            <a:endParaRPr lang="en-US" dirty="0"/>
           </a:p>
         </p:txBody>
       </p:sp>
@@ -2463,16 +2641,24 @@
         </p:nvSpPr>
         <p:spPr>
           <a:xfrm>
-            <a:off x="693482" y="1849279"/>
-            <a:ext cx="4259204" cy="906303"/>
-          </a:xfrm>
-        </p:spPr>
-        <p:txBody>
-          <a:bodyPr anchor="b"/>
+            <a:off x="356616" y="1306284"/>
+            <a:ext cx="4489704" cy="1066799"/>
+          </a:xfrm>
+        </p:spPr>
+        <p:txBody>
+          <a:bodyPr anchor="b">
+            <a:normAutofit/>
+          </a:bodyPr>
           <a:lstStyle>
             <a:lvl1pPr marL="0" indent="0">
-              <a:buNone/>
-              <a:defRPr sz="2640" b="1"/>
+              <a:lnSpc>
+                <a:spcPts val="2000"/>
+              </a:lnSpc>
+              <a:spcBef>
+                <a:spcPts val="1100"/>
+              </a:spcBef>
+              <a:buNone/>
+              <a:defRPr sz="1400" b="0"/>
             </a:lvl1pPr>
             <a:lvl2pPr marL="502920" indent="0">
               <a:buNone/>
@@ -2510,7 +2696,7 @@
           <a:p>
             <a:pPr lvl="0"/>
             <a:r>
-              <a:rPr lang="en-US"/>
+              <a:rPr lang="en-US" dirty="0"/>
               <a:t>Click to edit Master text styles</a:t>
             </a:r>
           </a:p>
@@ -2528,8 +2714,8 @@
         </p:nvSpPr>
         <p:spPr>
           <a:xfrm>
-            <a:off x="693482" y="2755582"/>
-            <a:ext cx="4259204" cy="4053047"/>
+            <a:off x="356616" y="2522483"/>
+            <a:ext cx="4489704" cy="4116061"/>
           </a:xfrm>
         </p:spPr>
         <p:txBody>
@@ -2538,38 +2724,37 @@
           <a:p>
             <a:pPr lvl="0"/>
             <a:r>
-              <a:rPr lang="en-US"/>
+              <a:rPr lang="en-US" dirty="0"/>
               <a:t>Click to edit Master text styles</a:t>
             </a:r>
           </a:p>
           <a:p>
             <a:pPr lvl="1"/>
             <a:r>
-              <a:rPr lang="en-US"/>
+              <a:rPr lang="en-US" dirty="0"/>
               <a:t>Second level</a:t>
             </a:r>
           </a:p>
           <a:p>
             <a:pPr lvl="2"/>
             <a:r>
-              <a:rPr lang="en-US"/>
+              <a:rPr lang="en-US" dirty="0"/>
               <a:t>Third level</a:t>
             </a:r>
           </a:p>
           <a:p>
             <a:pPr lvl="3"/>
             <a:r>
-              <a:rPr lang="en-US"/>
+              <a:rPr lang="en-US" dirty="0"/>
               <a:t>Fourth level</a:t>
             </a:r>
           </a:p>
           <a:p>
             <a:pPr lvl="4"/>
             <a:r>
-              <a:rPr lang="en-US"/>
+              <a:rPr lang="en-US" dirty="0"/>
               <a:t>Fifth level</a:t>
             </a:r>
-            <a:endParaRPr lang="en-US" dirty="0"/>
           </a:p>
         </p:txBody>
       </p:sp>
@@ -2585,16 +2770,21 @@
         </p:nvSpPr>
         <p:spPr>
           <a:xfrm>
-            <a:off x="5096888" y="1849279"/>
-            <a:ext cx="4280179" cy="906303"/>
-          </a:xfrm>
-        </p:spPr>
-        <p:txBody>
-          <a:bodyPr anchor="b"/>
+            <a:off x="5202936" y="1306284"/>
+            <a:ext cx="4489704" cy="1066792"/>
+          </a:xfrm>
+        </p:spPr>
+        <p:txBody>
+          <a:bodyPr anchor="b">
+            <a:normAutofit/>
+          </a:bodyPr>
           <a:lstStyle>
             <a:lvl1pPr marL="0" indent="0">
-              <a:buNone/>
-              <a:defRPr sz="2640" b="1"/>
+              <a:lnSpc>
+                <a:spcPts val="2000"/>
+              </a:lnSpc>
+              <a:buNone/>
+              <a:defRPr sz="1400" b="0"/>
             </a:lvl1pPr>
             <a:lvl2pPr marL="502920" indent="0">
               <a:buNone/>
@@ -2632,108 +2822,9 @@
           <a:p>
             <a:pPr lvl="0"/>
             <a:r>
-              <a:rPr lang="en-US"/>
+              <a:rPr lang="en-US" dirty="0"/>
               <a:t>Click to edit Master text styles</a:t>
             </a:r>
-          </a:p>
-        </p:txBody>
-      </p:sp>
-      <p:sp>
-        <p:nvSpPr>
-          <p:cNvPr id="6" name="Content Placeholder 5"/>
-          <p:cNvSpPr>
-            <a:spLocks noGrp="1"/>
-          </p:cNvSpPr>
-          <p:nvPr>
-            <p:ph sz="quarter" idx="4"/>
-          </p:nvPr>
-        </p:nvSpPr>
-        <p:spPr>
-          <a:xfrm>
-            <a:off x="5096888" y="2755582"/>
-            <a:ext cx="4280179" cy="4053047"/>
-          </a:xfrm>
-        </p:spPr>
-        <p:txBody>
-          <a:bodyPr/>
-          <a:lstStyle/>
-          <a:p>
-            <a:pPr lvl="0"/>
-            <a:r>
-              <a:rPr lang="en-US"/>
-              <a:t>Click to edit Master text styles</a:t>
-            </a:r>
-          </a:p>
-          <a:p>
-            <a:pPr lvl="1"/>
-            <a:r>
-              <a:rPr lang="en-US"/>
-              <a:t>Second level</a:t>
-            </a:r>
-          </a:p>
-          <a:p>
-            <a:pPr lvl="2"/>
-            <a:r>
-              <a:rPr lang="en-US"/>
-              <a:t>Third level</a:t>
-            </a:r>
-          </a:p>
-          <a:p>
-            <a:pPr lvl="3"/>
-            <a:r>
-              <a:rPr lang="en-US"/>
-              <a:t>Fourth level</a:t>
-            </a:r>
-          </a:p>
-          <a:p>
-            <a:pPr lvl="4"/>
-            <a:r>
-              <a:rPr lang="en-US"/>
-              <a:t>Fifth level</a:t>
-            </a:r>
-            <a:endParaRPr lang="en-US" dirty="0"/>
-          </a:p>
-        </p:txBody>
-      </p:sp>
-      <p:sp>
-        <p:nvSpPr>
-          <p:cNvPr id="7" name="Date Placeholder 6"/>
-          <p:cNvSpPr>
-            <a:spLocks noGrp="1"/>
-          </p:cNvSpPr>
-          <p:nvPr>
-            <p:ph type="dt" sz="half" idx="10"/>
-          </p:nvPr>
-        </p:nvSpPr>
-        <p:spPr/>
-        <p:txBody>
-          <a:bodyPr/>
-          <a:lstStyle/>
-          <a:p>
-            <a:fld id="{B35CD269-42B5-4067-A42B-F772DEB587E1}" type="datetimeFigureOut">
-              <a:rPr lang="en-US" smtClean="0"/>
-              <a:t>6/28/23</a:t>
-            </a:fld>
-            <a:endParaRPr lang="en-US"/>
-          </a:p>
-        </p:txBody>
-      </p:sp>
-      <p:sp>
-        <p:nvSpPr>
-          <p:cNvPr id="8" name="Footer Placeholder 7"/>
-          <p:cNvSpPr>
-            <a:spLocks noGrp="1"/>
-          </p:cNvSpPr>
-          <p:nvPr>
-            <p:ph type="ftr" sz="quarter" idx="11"/>
-          </p:nvPr>
-        </p:nvSpPr>
-        <p:spPr/>
-        <p:txBody>
-          <a:bodyPr/>
-          <a:lstStyle/>
-          <a:p>
-            <a:endParaRPr lang="en-US"/>
           </a:p>
         </p:txBody>
       </p:sp>
@@ -2760,130 +2851,12 @@
           </a:p>
         </p:txBody>
       </p:sp>
-    </p:spTree>
-    <p:extLst>
-      <p:ext uri="{BB962C8B-B14F-4D97-AF65-F5344CB8AC3E}">
-        <p14:creationId xmlns:p14="http://schemas.microsoft.com/office/powerpoint/2010/main" val="2952082002"/>
-      </p:ext>
-    </p:extLst>
-  </p:cSld>
-  <p:clrMapOvr>
-    <a:masterClrMapping/>
-  </p:clrMapOvr>
-</p:sldLayout>
-</file>
-
-<file path=ppt/slideLayouts/slideLayout6.xml><?xml version="1.0" encoding="utf-8"?>
-<p:sldLayout xmlns:a="http://schemas.openxmlformats.org/drawingml/2006/main" xmlns:r="http://schemas.openxmlformats.org/officeDocument/2006/relationships" xmlns:p="http://schemas.openxmlformats.org/presentationml/2006/main" type="titleOnly" preserve="1">
-  <p:cSld name="Title Only">
-    <p:spTree>
-      <p:nvGrpSpPr>
-        <p:cNvPr id="1" name=""/>
-        <p:cNvGrpSpPr/>
-        <p:nvPr/>
-      </p:nvGrpSpPr>
-      <p:grpSpPr>
-        <a:xfrm>
-          <a:off x="0" y="0"/>
-          <a:ext cx="0" cy="0"/>
-          <a:chOff x="0" y="0"/>
-          <a:chExt cx="0" cy="0"/>
-        </a:xfrm>
-      </p:grpSpPr>
-      <p:sp>
-        <p:nvSpPr>
-          <p:cNvPr id="2" name="Title 1"/>
-          <p:cNvSpPr>
-            <a:spLocks noGrp="1"/>
-          </p:cNvSpPr>
-          <p:nvPr>
-            <p:ph type="title"/>
-          </p:nvPr>
-        </p:nvSpPr>
-        <p:spPr/>
-        <p:txBody>
-          <a:bodyPr/>
-          <a:lstStyle/>
-          <a:p>
-            <a:r>
-              <a:rPr lang="en-US"/>
-              <a:t>Click to edit Master title style</a:t>
-            </a:r>
-            <a:endParaRPr lang="en-US" dirty="0"/>
-          </a:p>
-        </p:txBody>
-      </p:sp>
-      <p:sp>
-        <p:nvSpPr>
-          <p:cNvPr id="3" name="Date Placeholder 2"/>
-          <p:cNvSpPr>
-            <a:spLocks noGrp="1"/>
-          </p:cNvSpPr>
-          <p:nvPr>
-            <p:ph type="dt" sz="half" idx="10"/>
-          </p:nvPr>
-        </p:nvSpPr>
-        <p:spPr/>
-        <p:txBody>
-          <a:bodyPr/>
-          <a:lstStyle/>
-          <a:p>
-            <a:fld id="{B35CD269-42B5-4067-A42B-F772DEB587E1}" type="datetimeFigureOut">
-              <a:rPr lang="en-US" smtClean="0"/>
-              <a:t>6/28/23</a:t>
-            </a:fld>
-            <a:endParaRPr lang="en-US"/>
-          </a:p>
-        </p:txBody>
-      </p:sp>
-      <p:sp>
-        <p:nvSpPr>
-          <p:cNvPr id="4" name="Footer Placeholder 3"/>
-          <p:cNvSpPr>
-            <a:spLocks noGrp="1"/>
-          </p:cNvSpPr>
-          <p:nvPr>
-            <p:ph type="ftr" sz="quarter" idx="11"/>
-          </p:nvPr>
-        </p:nvSpPr>
-        <p:spPr/>
-        <p:txBody>
-          <a:bodyPr/>
-          <a:lstStyle/>
-          <a:p>
-            <a:endParaRPr lang="en-US"/>
-          </a:p>
-        </p:txBody>
-      </p:sp>
-      <p:sp>
-        <p:nvSpPr>
-          <p:cNvPr id="5" name="Slide Number Placeholder 4"/>
-          <p:cNvSpPr>
-            <a:spLocks noGrp="1"/>
-          </p:cNvSpPr>
-          <p:nvPr>
-            <p:ph type="sldNum" sz="quarter" idx="12"/>
-          </p:nvPr>
-        </p:nvSpPr>
-        <p:spPr/>
-        <p:txBody>
-          <a:bodyPr/>
-          <a:lstStyle/>
-          <a:p>
-            <a:fld id="{141F55E9-9A83-45A8-A91F-A02EDC2352D1}" type="slidenum">
-              <a:rPr lang="en-US" smtClean="0"/>
-              <a:t>‹#›</a:t>
-            </a:fld>
-            <a:endParaRPr lang="en-US"/>
-          </a:p>
-        </p:txBody>
-      </p:sp>
       <p:cxnSp>
         <p:nvCxnSpPr>
-          <p:cNvPr id="6" name="Straight Connector 5">
+          <p:cNvPr id="10" name="Straight Connector 9">
             <a:extLst>
               <a:ext uri="{FF2B5EF4-FFF2-40B4-BE49-F238E27FC236}">
-                <a16:creationId xmlns:a16="http://schemas.microsoft.com/office/drawing/2014/main" id="{36D2FDC6-9AC8-F557-E49F-6A63B702D0F3}"/>
+                <a16:creationId xmlns:a16="http://schemas.microsoft.com/office/drawing/2014/main" id="{9D806ED8-BB76-CB9B-F68F-43ED3EFEB36D}"/>
               </a:ext>
             </a:extLst>
           </p:cNvPr>
@@ -2921,10 +2894,10 @@
       </p:cxnSp>
       <p:pic>
         <p:nvPicPr>
-          <p:cNvPr id="7" name="Picture 6">
+          <p:cNvPr id="11" name="Picture 10">
             <a:extLst>
               <a:ext uri="{FF2B5EF4-FFF2-40B4-BE49-F238E27FC236}">
-                <a16:creationId xmlns:a16="http://schemas.microsoft.com/office/drawing/2014/main" id="{407AB9FE-E4E1-B647-882E-FBADF0C18C3A}"/>
+                <a16:creationId xmlns:a16="http://schemas.microsoft.com/office/drawing/2014/main" id="{F4CB4852-F4C3-0CEE-3648-83017F955D48}"/>
               </a:ext>
             </a:extLst>
           </p:cNvPr>
@@ -2955,10 +2928,117 @@
           </a:prstGeom>
         </p:spPr>
       </p:pic>
+      <p:sp>
+        <p:nvSpPr>
+          <p:cNvPr id="14" name="Content Placeholder 5">
+            <a:extLst>
+              <a:ext uri="{FF2B5EF4-FFF2-40B4-BE49-F238E27FC236}">
+                <a16:creationId xmlns:a16="http://schemas.microsoft.com/office/drawing/2014/main" id="{24BAD94E-3A05-6D72-12C9-DEB71B47B06E}"/>
+              </a:ext>
+            </a:extLst>
+          </p:cNvPr>
+          <p:cNvSpPr>
+            <a:spLocks noGrp="1"/>
+          </p:cNvSpPr>
+          <p:nvPr>
+            <p:ph sz="quarter" idx="14"/>
+          </p:nvPr>
+        </p:nvSpPr>
+        <p:spPr>
+          <a:xfrm>
+            <a:off x="5202936" y="2522479"/>
+            <a:ext cx="4489704" cy="4116061"/>
+          </a:xfrm>
+        </p:spPr>
+        <p:txBody>
+          <a:bodyPr/>
+          <a:lstStyle/>
+          <a:p>
+            <a:pPr lvl="0"/>
+            <a:r>
+              <a:rPr lang="en-US" dirty="0"/>
+              <a:t>Click to edit Master text styles</a:t>
+            </a:r>
+          </a:p>
+          <a:p>
+            <a:pPr lvl="1"/>
+            <a:r>
+              <a:rPr lang="en-US" dirty="0"/>
+              <a:t>Second level</a:t>
+            </a:r>
+          </a:p>
+          <a:p>
+            <a:pPr lvl="2"/>
+            <a:r>
+              <a:rPr lang="en-US" dirty="0"/>
+              <a:t>Third level</a:t>
+            </a:r>
+          </a:p>
+          <a:p>
+            <a:pPr lvl="3"/>
+            <a:r>
+              <a:rPr lang="en-US" dirty="0"/>
+              <a:t>Fourth level</a:t>
+            </a:r>
+          </a:p>
+          <a:p>
+            <a:pPr lvl="4"/>
+            <a:r>
+              <a:rPr lang="en-US" dirty="0"/>
+              <a:t>Fifth level</a:t>
+            </a:r>
+          </a:p>
+        </p:txBody>
+      </p:sp>
+      <p:sp>
+        <p:nvSpPr>
+          <p:cNvPr id="6" name="Footer Placeholder 4">
+            <a:extLst>
+              <a:ext uri="{FF2B5EF4-FFF2-40B4-BE49-F238E27FC236}">
+                <a16:creationId xmlns:a16="http://schemas.microsoft.com/office/drawing/2014/main" id="{BF45BA92-637D-92E8-F417-984901E74B18}"/>
+              </a:ext>
+            </a:extLst>
+          </p:cNvPr>
+          <p:cNvSpPr>
+            <a:spLocks noGrp="1"/>
+          </p:cNvSpPr>
+          <p:nvPr>
+            <p:ph type="ftr" sz="quarter" idx="15"/>
+          </p:nvPr>
+        </p:nvSpPr>
+        <p:spPr>
+          <a:xfrm>
+            <a:off x="3335000" y="7187184"/>
+            <a:ext cx="3397925" cy="182880"/>
+          </a:xfrm>
+          <a:prstGeom prst="rect">
+            <a:avLst/>
+          </a:prstGeom>
+        </p:spPr>
+        <p:txBody>
+          <a:bodyPr vert="horz" lIns="91440" tIns="45720" rIns="91440" bIns="45720" rtlCol="0" anchor="ctr"/>
+          <a:lstStyle>
+            <a:lvl1pPr algn="ctr">
+              <a:defRPr sz="1000">
+                <a:solidFill>
+                  <a:schemeClr val="tx1">
+                    <a:tint val="75000"/>
+                  </a:schemeClr>
+                </a:solidFill>
+                <a:latin typeface="Calibri" panose="020F0502020204030204" pitchFamily="34" charset="0"/>
+                <a:cs typeface="Calibri" panose="020F0502020204030204" pitchFamily="34" charset="0"/>
+              </a:defRPr>
+            </a:lvl1pPr>
+          </a:lstStyle>
+          <a:p>
+            <a:endParaRPr lang="en-US" dirty="0"/>
+          </a:p>
+        </p:txBody>
+      </p:sp>
     </p:spTree>
     <p:extLst>
       <p:ext uri="{BB962C8B-B14F-4D97-AF65-F5344CB8AC3E}">
-        <p14:creationId xmlns:p14="http://schemas.microsoft.com/office/powerpoint/2010/main" val="3064609479"/>
+        <p14:creationId xmlns:p14="http://schemas.microsoft.com/office/powerpoint/2010/main" val="2910756242"/>
       </p:ext>
     </p:extLst>
   </p:cSld>
@@ -2968,7 +3048,7 @@
 </p:sldLayout>
 </file>
 
-<file path=ppt/slideLayouts/slideLayout7.xml><?xml version="1.0" encoding="utf-8"?>
+<file path=ppt/slideLayouts/slideLayout6.xml><?xml version="1.0" encoding="utf-8"?>
 <p:sldLayout xmlns:a="http://schemas.openxmlformats.org/drawingml/2006/main" xmlns:r="http://schemas.openxmlformats.org/officeDocument/2006/relationships" xmlns:p="http://schemas.openxmlformats.org/presentationml/2006/main" type="blank" preserve="1">
   <p:cSld name="Blank">
     <p:spTree>
@@ -2987,12 +3067,12 @@
       </p:grpSpPr>
       <p:sp>
         <p:nvSpPr>
-          <p:cNvPr id="2" name="Date Placeholder 1"/>
-          <p:cNvSpPr>
-            <a:spLocks noGrp="1"/>
-          </p:cNvSpPr>
-          <p:nvPr>
-            <p:ph type="dt" sz="half" idx="10"/>
+          <p:cNvPr id="4" name="Slide Number Placeholder 3"/>
+          <p:cNvSpPr>
+            <a:spLocks noGrp="1"/>
+          </p:cNvSpPr>
+          <p:nvPr>
+            <p:ph type="sldNum" sz="quarter" idx="12"/>
           </p:nvPr>
         </p:nvSpPr>
         <p:spPr/>
@@ -3000,60 +3080,6 @@
           <a:bodyPr/>
           <a:lstStyle/>
           <a:p>
-            <a:fld id="{C764DE79-268F-4C1A-8933-263129D2AF90}" type="datetimeFigureOut">
-              <a:rPr lang="en-US" smtClean="0"/>
-              <a:t>6/28/23</a:t>
-            </a:fld>
-            <a:endParaRPr lang="en-US" dirty="0"/>
-          </a:p>
-        </p:txBody>
-      </p:sp>
-      <p:sp>
-        <p:nvSpPr>
-          <p:cNvPr id="3" name="Footer Placeholder 2"/>
-          <p:cNvSpPr>
-            <a:spLocks noGrp="1"/>
-          </p:cNvSpPr>
-          <p:nvPr>
-            <p:ph type="ftr" sz="quarter" idx="11"/>
-          </p:nvPr>
-        </p:nvSpPr>
-        <p:spPr/>
-        <p:txBody>
-          <a:bodyPr/>
-          <a:lstStyle/>
-          <a:p>
-            <a:endParaRPr lang="en-US" dirty="0"/>
-          </a:p>
-        </p:txBody>
-      </p:sp>
-      <p:sp>
-        <p:nvSpPr>
-          <p:cNvPr id="4" name="Slide Number Placeholder 3"/>
-          <p:cNvSpPr>
-            <a:spLocks noGrp="1"/>
-          </p:cNvSpPr>
-          <p:nvPr>
-            <p:ph type="sldNum" sz="quarter" idx="12"/>
-          </p:nvPr>
-        </p:nvSpPr>
-        <p:spPr/>
-        <p:txBody>
-          <a:bodyPr/>
-          <a:lstStyle/>
-          <a:p>
-            <a:r>
-              <a:rPr lang="en-US"/>
-              <a:t> </a:t>
-            </a:r>
-            <a:r>
-              <a:rPr lang="en-US" b="1" i="1"/>
-              <a:t>Page</a:t>
-            </a:r>
-            <a:r>
-              <a:rPr lang="en-US"/>
-              <a:t> </a:t>
-            </a:r>
             <a:fld id="{141F55E9-9A83-45A8-A91F-A02EDC2352D1}" type="slidenum">
               <a:rPr lang="en-US" smtClean="0"/>
               <a:pPr/>
@@ -3063,10 +3089,416 @@
           </a:p>
         </p:txBody>
       </p:sp>
+      <p:sp>
+        <p:nvSpPr>
+          <p:cNvPr id="5" name="Footer Placeholder 4">
+            <a:extLst>
+              <a:ext uri="{FF2B5EF4-FFF2-40B4-BE49-F238E27FC236}">
+                <a16:creationId xmlns:a16="http://schemas.microsoft.com/office/drawing/2014/main" id="{2CC6190F-B900-BE17-4267-9F84964B45ED}"/>
+              </a:ext>
+            </a:extLst>
+          </p:cNvPr>
+          <p:cNvSpPr>
+            <a:spLocks noGrp="1"/>
+          </p:cNvSpPr>
+          <p:nvPr>
+            <p:ph type="ftr" sz="quarter" idx="3"/>
+          </p:nvPr>
+        </p:nvSpPr>
+        <p:spPr>
+          <a:xfrm>
+            <a:off x="3335000" y="7187184"/>
+            <a:ext cx="3397925" cy="182880"/>
+          </a:xfrm>
+          <a:prstGeom prst="rect">
+            <a:avLst/>
+          </a:prstGeom>
+        </p:spPr>
+        <p:txBody>
+          <a:bodyPr vert="horz" lIns="91440" tIns="45720" rIns="91440" bIns="45720" rtlCol="0" anchor="ctr"/>
+          <a:lstStyle>
+            <a:lvl1pPr algn="ctr">
+              <a:defRPr sz="1000">
+                <a:solidFill>
+                  <a:schemeClr val="tx1">
+                    <a:tint val="75000"/>
+                  </a:schemeClr>
+                </a:solidFill>
+                <a:latin typeface="Calibri" panose="020F0502020204030204" pitchFamily="34" charset="0"/>
+                <a:cs typeface="Calibri" panose="020F0502020204030204" pitchFamily="34" charset="0"/>
+              </a:defRPr>
+            </a:lvl1pPr>
+          </a:lstStyle>
+          <a:p>
+            <a:endParaRPr lang="en-US" dirty="0"/>
+          </a:p>
+        </p:txBody>
+      </p:sp>
     </p:spTree>
     <p:extLst>
       <p:ext uri="{BB962C8B-B14F-4D97-AF65-F5344CB8AC3E}">
         <p14:creationId xmlns:p14="http://schemas.microsoft.com/office/powerpoint/2010/main" val="2357466748"/>
+      </p:ext>
+    </p:extLst>
+  </p:cSld>
+  <p:clrMapOvr>
+    <a:masterClrMapping/>
+  </p:clrMapOvr>
+</p:sldLayout>
+</file>
+
+<file path=ppt/slideLayouts/slideLayout7.xml><?xml version="1.0" encoding="utf-8"?>
+<p:sldLayout xmlns:a="http://schemas.openxmlformats.org/drawingml/2006/main" xmlns:r="http://schemas.openxmlformats.org/officeDocument/2006/relationships" xmlns:p="http://schemas.openxmlformats.org/presentationml/2006/main" preserve="1" userDrawn="1">
+  <p:cSld name="Content with Caption">
+    <p:spTree>
+      <p:nvGrpSpPr>
+        <p:cNvPr id="1" name=""/>
+        <p:cNvGrpSpPr/>
+        <p:nvPr/>
+      </p:nvGrpSpPr>
+      <p:grpSpPr>
+        <a:xfrm>
+          <a:off x="0" y="0"/>
+          <a:ext cx="0" cy="0"/>
+          <a:chOff x="0" y="0"/>
+          <a:chExt cx="0" cy="0"/>
+        </a:xfrm>
+      </p:grpSpPr>
+      <p:sp>
+        <p:nvSpPr>
+          <p:cNvPr id="3" name="Content Placeholder 2"/>
+          <p:cNvSpPr>
+            <a:spLocks noGrp="1"/>
+          </p:cNvSpPr>
+          <p:nvPr>
+            <p:ph idx="1"/>
+          </p:nvPr>
+        </p:nvSpPr>
+        <p:spPr>
+          <a:xfrm>
+            <a:off x="3960400" y="1371600"/>
+            <a:ext cx="5416666" cy="5266944"/>
+          </a:xfrm>
+        </p:spPr>
+        <p:txBody>
+          <a:bodyPr>
+            <a:normAutofit/>
+          </a:bodyPr>
+          <a:lstStyle>
+            <a:lvl1pPr>
+              <a:defRPr sz="1400"/>
+            </a:lvl1pPr>
+            <a:lvl2pPr>
+              <a:defRPr sz="1400"/>
+            </a:lvl2pPr>
+            <a:lvl3pPr>
+              <a:defRPr sz="1400"/>
+            </a:lvl3pPr>
+            <a:lvl4pPr>
+              <a:defRPr sz="1400"/>
+            </a:lvl4pPr>
+            <a:lvl5pPr>
+              <a:defRPr sz="1400"/>
+            </a:lvl5pPr>
+            <a:lvl6pPr>
+              <a:defRPr sz="2200"/>
+            </a:lvl6pPr>
+            <a:lvl7pPr>
+              <a:defRPr sz="2200"/>
+            </a:lvl7pPr>
+            <a:lvl8pPr>
+              <a:defRPr sz="2200"/>
+            </a:lvl8pPr>
+            <a:lvl9pPr>
+              <a:defRPr sz="2200"/>
+            </a:lvl9pPr>
+          </a:lstStyle>
+          <a:p>
+            <a:pPr lvl="0"/>
+            <a:r>
+              <a:rPr lang="en-US" dirty="0"/>
+              <a:t>Click to edit Master text styles</a:t>
+            </a:r>
+          </a:p>
+          <a:p>
+            <a:pPr lvl="1"/>
+            <a:r>
+              <a:rPr lang="en-US" dirty="0"/>
+              <a:t>Second level</a:t>
+            </a:r>
+          </a:p>
+          <a:p>
+            <a:pPr lvl="2"/>
+            <a:r>
+              <a:rPr lang="en-US" dirty="0"/>
+              <a:t>Third level</a:t>
+            </a:r>
+          </a:p>
+          <a:p>
+            <a:pPr lvl="3"/>
+            <a:r>
+              <a:rPr lang="en-US" dirty="0"/>
+              <a:t>Fourth level</a:t>
+            </a:r>
+          </a:p>
+          <a:p>
+            <a:pPr lvl="4"/>
+            <a:r>
+              <a:rPr lang="en-US" dirty="0"/>
+              <a:t>Fifth level</a:t>
+            </a:r>
+          </a:p>
+        </p:txBody>
+      </p:sp>
+      <p:sp>
+        <p:nvSpPr>
+          <p:cNvPr id="4" name="Text Placeholder 3"/>
+          <p:cNvSpPr>
+            <a:spLocks noGrp="1"/>
+          </p:cNvSpPr>
+          <p:nvPr>
+            <p:ph type="body" sz="half" idx="2"/>
+          </p:nvPr>
+        </p:nvSpPr>
+        <p:spPr>
+          <a:xfrm>
+            <a:off x="356616" y="1371600"/>
+            <a:ext cx="3247168" cy="5266944"/>
+          </a:xfrm>
+        </p:spPr>
+        <p:txBody>
+          <a:bodyPr>
+            <a:normAutofit/>
+          </a:bodyPr>
+          <a:lstStyle>
+            <a:lvl1pPr marL="0" indent="0">
+              <a:buNone/>
+              <a:defRPr sz="1400"/>
+            </a:lvl1pPr>
+            <a:lvl2pPr marL="502920" indent="0">
+              <a:buNone/>
+              <a:defRPr sz="1540"/>
+            </a:lvl2pPr>
+            <a:lvl3pPr marL="1005840" indent="0">
+              <a:buNone/>
+              <a:defRPr sz="1320"/>
+            </a:lvl3pPr>
+            <a:lvl4pPr marL="1508760" indent="0">
+              <a:buNone/>
+              <a:defRPr sz="1100"/>
+            </a:lvl4pPr>
+            <a:lvl5pPr marL="2011680" indent="0">
+              <a:buNone/>
+              <a:defRPr sz="1100"/>
+            </a:lvl5pPr>
+            <a:lvl6pPr marL="2514600" indent="0">
+              <a:buNone/>
+              <a:defRPr sz="1100"/>
+            </a:lvl6pPr>
+            <a:lvl7pPr marL="3017520" indent="0">
+              <a:buNone/>
+              <a:defRPr sz="1100"/>
+            </a:lvl7pPr>
+            <a:lvl8pPr marL="3520440" indent="0">
+              <a:buNone/>
+              <a:defRPr sz="1100"/>
+            </a:lvl8pPr>
+            <a:lvl9pPr marL="4023360" indent="0">
+              <a:buNone/>
+              <a:defRPr sz="1100"/>
+            </a:lvl9pPr>
+          </a:lstStyle>
+          <a:p>
+            <a:pPr lvl="0"/>
+            <a:r>
+              <a:rPr lang="en-US" dirty="0"/>
+              <a:t>Click to edit Master text styles</a:t>
+            </a:r>
+          </a:p>
+        </p:txBody>
+      </p:sp>
+      <p:sp>
+        <p:nvSpPr>
+          <p:cNvPr id="7" name="Slide Number Placeholder 6"/>
+          <p:cNvSpPr>
+            <a:spLocks noGrp="1"/>
+          </p:cNvSpPr>
+          <p:nvPr>
+            <p:ph type="sldNum" sz="quarter" idx="12"/>
+          </p:nvPr>
+        </p:nvSpPr>
+        <p:spPr/>
+        <p:txBody>
+          <a:bodyPr/>
+          <a:lstStyle/>
+          <a:p>
+            <a:fld id="{141F55E9-9A83-45A8-A91F-A02EDC2352D1}" type="slidenum">
+              <a:rPr lang="en-US" smtClean="0"/>
+              <a:t>‹#›</a:t>
+            </a:fld>
+            <a:endParaRPr lang="en-US"/>
+          </a:p>
+        </p:txBody>
+      </p:sp>
+      <p:sp>
+        <p:nvSpPr>
+          <p:cNvPr id="8" name="Title 1">
+            <a:extLst>
+              <a:ext uri="{FF2B5EF4-FFF2-40B4-BE49-F238E27FC236}">
+                <a16:creationId xmlns:a16="http://schemas.microsoft.com/office/drawing/2014/main" id="{FE8BC51B-A3B5-0244-248D-9BF72AE487BD}"/>
+              </a:ext>
+            </a:extLst>
+          </p:cNvPr>
+          <p:cNvSpPr>
+            <a:spLocks noGrp="1"/>
+          </p:cNvSpPr>
+          <p:nvPr>
+            <p:ph type="title"/>
+          </p:nvPr>
+        </p:nvSpPr>
+        <p:spPr>
+          <a:xfrm>
+            <a:off x="356616" y="356616"/>
+            <a:ext cx="7543800" cy="356616"/>
+          </a:xfrm>
+        </p:spPr>
+        <p:txBody>
+          <a:bodyPr/>
+          <a:lstStyle/>
+          <a:p>
+            <a:r>
+              <a:rPr lang="en-US" dirty="0"/>
+              <a:t>Click to edit Master title style</a:t>
+            </a:r>
+          </a:p>
+        </p:txBody>
+      </p:sp>
+      <p:cxnSp>
+        <p:nvCxnSpPr>
+          <p:cNvPr id="9" name="Straight Connector 8">
+            <a:extLst>
+              <a:ext uri="{FF2B5EF4-FFF2-40B4-BE49-F238E27FC236}">
+                <a16:creationId xmlns:a16="http://schemas.microsoft.com/office/drawing/2014/main" id="{74469450-2352-1B4C-B64C-69EDFA4DDCCC}"/>
+              </a:ext>
+            </a:extLst>
+          </p:cNvPr>
+          <p:cNvCxnSpPr/>
+          <p:nvPr userDrawn="1"/>
+        </p:nvCxnSpPr>
+        <p:spPr>
+          <a:xfrm>
+            <a:off x="356616" y="976256"/>
+            <a:ext cx="9345168" cy="0"/>
+          </a:xfrm>
+          <a:prstGeom prst="line">
+            <a:avLst/>
+          </a:prstGeom>
+          <a:ln w="19050">
+            <a:solidFill>
+              <a:schemeClr val="tx1"/>
+            </a:solidFill>
+          </a:ln>
+        </p:spPr>
+        <p:style>
+          <a:lnRef idx="1">
+            <a:schemeClr val="dk1"/>
+          </a:lnRef>
+          <a:fillRef idx="0">
+            <a:schemeClr val="dk1"/>
+          </a:fillRef>
+          <a:effectRef idx="0">
+            <a:schemeClr val="dk1"/>
+          </a:effectRef>
+          <a:fontRef idx="minor">
+            <a:schemeClr val="tx1"/>
+          </a:fontRef>
+        </p:style>
+      </p:cxnSp>
+      <p:pic>
+        <p:nvPicPr>
+          <p:cNvPr id="10" name="Picture 9">
+            <a:extLst>
+              <a:ext uri="{FF2B5EF4-FFF2-40B4-BE49-F238E27FC236}">
+                <a16:creationId xmlns:a16="http://schemas.microsoft.com/office/drawing/2014/main" id="{C003E5C2-831E-7794-7E87-A26F800F0237}"/>
+              </a:ext>
+            </a:extLst>
+          </p:cNvPr>
+          <p:cNvPicPr>
+            <a:picLocks noChangeAspect="1"/>
+          </p:cNvPicPr>
+          <p:nvPr userDrawn="1"/>
+        </p:nvPicPr>
+        <p:blipFill>
+          <a:blip r:embed="rId2">
+            <a:extLst>
+              <a:ext uri="{28A0092B-C50C-407E-A947-70E740481C1C}">
+                <a14:useLocalDpi xmlns:a14="http://schemas.microsoft.com/office/drawing/2010/main" val="0"/>
+              </a:ext>
+            </a:extLst>
+          </a:blip>
+          <a:stretch>
+            <a:fillRect/>
+          </a:stretch>
+        </p:blipFill>
+        <p:spPr>
+          <a:xfrm>
+            <a:off x="8357622" y="346127"/>
+            <a:ext cx="1370585" cy="337252"/>
+          </a:xfrm>
+          <a:prstGeom prst="rect">
+            <a:avLst/>
+          </a:prstGeom>
+        </p:spPr>
+      </p:pic>
+      <p:sp>
+        <p:nvSpPr>
+          <p:cNvPr id="12" name="Footer Placeholder 4">
+            <a:extLst>
+              <a:ext uri="{FF2B5EF4-FFF2-40B4-BE49-F238E27FC236}">
+                <a16:creationId xmlns:a16="http://schemas.microsoft.com/office/drawing/2014/main" id="{C5FFED2E-E650-2E4C-714B-ADF0B470D0E1}"/>
+              </a:ext>
+            </a:extLst>
+          </p:cNvPr>
+          <p:cNvSpPr>
+            <a:spLocks noGrp="1"/>
+          </p:cNvSpPr>
+          <p:nvPr>
+            <p:ph type="ftr" sz="quarter" idx="3"/>
+          </p:nvPr>
+        </p:nvSpPr>
+        <p:spPr>
+          <a:xfrm>
+            <a:off x="3335000" y="7187184"/>
+            <a:ext cx="3397925" cy="182880"/>
+          </a:xfrm>
+          <a:prstGeom prst="rect">
+            <a:avLst/>
+          </a:prstGeom>
+        </p:spPr>
+        <p:txBody>
+          <a:bodyPr vert="horz" lIns="91440" tIns="45720" rIns="91440" bIns="45720" rtlCol="0" anchor="ctr"/>
+          <a:lstStyle>
+            <a:lvl1pPr algn="ctr">
+              <a:defRPr sz="1000">
+                <a:solidFill>
+                  <a:schemeClr val="tx1">
+                    <a:tint val="75000"/>
+                  </a:schemeClr>
+                </a:solidFill>
+                <a:latin typeface="Calibri" panose="020F0502020204030204" pitchFamily="34" charset="0"/>
+                <a:cs typeface="Calibri" panose="020F0502020204030204" pitchFamily="34" charset="0"/>
+              </a:defRPr>
+            </a:lvl1pPr>
+          </a:lstStyle>
+          <a:p>
+            <a:endParaRPr lang="en-US" dirty="0"/>
+          </a:p>
+        </p:txBody>
+      </p:sp>
+    </p:spTree>
+    <p:extLst>
+      <p:ext uri="{BB962C8B-B14F-4D97-AF65-F5344CB8AC3E}">
+        <p14:creationId xmlns:p14="http://schemas.microsoft.com/office/powerpoint/2010/main" val="3664168863"/>
       </p:ext>
     </p:extLst>
   </p:cSld>
@@ -3105,15 +3537,15 @@
         </p:nvSpPr>
         <p:spPr>
           <a:xfrm>
-            <a:off x="693481" y="502920"/>
-            <a:ext cx="3247168" cy="1760220"/>
+            <a:off x="457201" y="204787"/>
+            <a:ext cx="3008313" cy="871538"/>
           </a:xfrm>
         </p:spPr>
         <p:txBody>
           <a:bodyPr anchor="b"/>
           <a:lstStyle>
-            <a:lvl1pPr>
-              <a:defRPr sz="3520"/>
+            <a:lvl1pPr algn="l">
+              <a:defRPr sz="1500" b="1"/>
             </a:lvl1pPr>
           </a:lstStyle>
           <a:p>
@@ -3121,7 +3553,6 @@
               <a:rPr lang="en-US"/>
               <a:t>Click to edit Master title style</a:t>
             </a:r>
-            <a:endParaRPr lang="en-US" dirty="0"/>
           </a:p>
         </p:txBody>
       </p:sp>
@@ -3137,39 +3568,39 @@
         </p:nvSpPr>
         <p:spPr>
           <a:xfrm>
-            <a:off x="4280179" y="1086169"/>
-            <a:ext cx="5096887" cy="5360988"/>
+            <a:off x="3575050" y="204788"/>
+            <a:ext cx="5111750" cy="4389835"/>
           </a:xfrm>
         </p:spPr>
         <p:txBody>
           <a:bodyPr/>
           <a:lstStyle>
             <a:lvl1pPr>
-              <a:defRPr sz="3520"/>
+              <a:defRPr sz="2400"/>
             </a:lvl1pPr>
             <a:lvl2pPr>
-              <a:defRPr sz="3080"/>
+              <a:defRPr sz="2100"/>
             </a:lvl2pPr>
             <a:lvl3pPr>
-              <a:defRPr sz="2640"/>
+              <a:defRPr sz="1800"/>
             </a:lvl3pPr>
             <a:lvl4pPr>
-              <a:defRPr sz="2200"/>
+              <a:defRPr sz="1500"/>
             </a:lvl4pPr>
             <a:lvl5pPr>
-              <a:defRPr sz="2200"/>
+              <a:defRPr sz="1500"/>
             </a:lvl5pPr>
             <a:lvl6pPr>
-              <a:defRPr sz="2200"/>
+              <a:defRPr sz="1500"/>
             </a:lvl6pPr>
             <a:lvl7pPr>
-              <a:defRPr sz="2200"/>
+              <a:defRPr sz="1500"/>
             </a:lvl7pPr>
             <a:lvl8pPr>
-              <a:defRPr sz="2200"/>
+              <a:defRPr sz="1500"/>
             </a:lvl8pPr>
             <a:lvl9pPr>
-              <a:defRPr sz="2200"/>
+              <a:defRPr sz="1500"/>
             </a:lvl9pPr>
           </a:lstStyle>
           <a:p>
@@ -3206,7 +3637,6 @@
               <a:rPr lang="en-US"/>
               <a:t>Fifth level</a:t>
             </a:r>
-            <a:endParaRPr lang="en-US" dirty="0"/>
           </a:p>
         </p:txBody>
       </p:sp>
@@ -3222,56 +3652,54 @@
         </p:nvSpPr>
         <p:spPr>
           <a:xfrm>
-            <a:off x="693481" y="2263140"/>
-            <a:ext cx="3247168" cy="4192747"/>
-          </a:xfrm>
-        </p:spPr>
-        <p:txBody>
-          <a:bodyPr>
-            <a:normAutofit/>
-          </a:bodyPr>
+            <a:off x="457201" y="1076326"/>
+            <a:ext cx="3008313" cy="3518297"/>
+          </a:xfrm>
+        </p:spPr>
+        <p:txBody>
+          <a:bodyPr/>
           <a:lstStyle>
             <a:lvl1pPr marL="0" indent="0">
               <a:buNone/>
-              <a:defRPr sz="1400"/>
+              <a:defRPr sz="1050"/>
             </a:lvl1pPr>
-            <a:lvl2pPr marL="502920" indent="0">
-              <a:buNone/>
-              <a:defRPr sz="1540"/>
+            <a:lvl2pPr marL="342900" indent="0">
+              <a:buNone/>
+              <a:defRPr sz="900"/>
             </a:lvl2pPr>
-            <a:lvl3pPr marL="1005840" indent="0">
-              <a:buNone/>
-              <a:defRPr sz="1320"/>
+            <a:lvl3pPr marL="685800" indent="0">
+              <a:buNone/>
+              <a:defRPr sz="750"/>
             </a:lvl3pPr>
-            <a:lvl4pPr marL="1508760" indent="0">
-              <a:buNone/>
-              <a:defRPr sz="1100"/>
+            <a:lvl4pPr marL="1028700" indent="0">
+              <a:buNone/>
+              <a:defRPr sz="675"/>
             </a:lvl4pPr>
-            <a:lvl5pPr marL="2011680" indent="0">
-              <a:buNone/>
-              <a:defRPr sz="1100"/>
+            <a:lvl5pPr marL="1371600" indent="0">
+              <a:buNone/>
+              <a:defRPr sz="675"/>
             </a:lvl5pPr>
-            <a:lvl6pPr marL="2514600" indent="0">
-              <a:buNone/>
-              <a:defRPr sz="1100"/>
+            <a:lvl6pPr marL="1714500" indent="0">
+              <a:buNone/>
+              <a:defRPr sz="675"/>
             </a:lvl6pPr>
-            <a:lvl7pPr marL="3017520" indent="0">
-              <a:buNone/>
-              <a:defRPr sz="1100"/>
+            <a:lvl7pPr marL="2057400" indent="0">
+              <a:buNone/>
+              <a:defRPr sz="675"/>
             </a:lvl7pPr>
-            <a:lvl8pPr marL="3520440" indent="0">
-              <a:buNone/>
-              <a:defRPr sz="1100"/>
+            <a:lvl8pPr marL="2400300" indent="0">
+              <a:buNone/>
+              <a:defRPr sz="675"/>
             </a:lvl8pPr>
-            <a:lvl9pPr marL="4023360" indent="0">
-              <a:buNone/>
-              <a:defRPr sz="1100"/>
+            <a:lvl9pPr marL="2743200" indent="0">
+              <a:buNone/>
+              <a:defRPr sz="675"/>
             </a:lvl9pPr>
           </a:lstStyle>
           <a:p>
             <a:pPr lvl="0"/>
             <a:r>
-              <a:rPr lang="en-US" dirty="0"/>
+              <a:rPr lang="en-US"/>
               <a:t>Click to edit Master text styles</a:t>
             </a:r>
           </a:p>
@@ -3292,9 +3720,9 @@
           <a:bodyPr/>
           <a:lstStyle/>
           <a:p>
-            <a:fld id="{B35CD269-42B5-4067-A42B-F772DEB587E1}" type="datetimeFigureOut">
+            <a:fld id="{241EB5C9-1307-BA42-ABA2-0BC069CD8E7F}" type="datetimeFigureOut">
               <a:rPr lang="en-US" smtClean="0"/>
-              <a:t>6/28/23</a:t>
+              <a:t>1/2/22</a:t>
             </a:fld>
             <a:endParaRPr lang="en-US"/>
           </a:p>
@@ -3334,7 +3762,7 @@
           <a:bodyPr/>
           <a:lstStyle/>
           <a:p>
-            <a:fld id="{141F55E9-9A83-45A8-A91F-A02EDC2352D1}" type="slidenum">
+            <a:fld id="{C5EF2332-01BF-834F-8236-50238282D533}" type="slidenum">
               <a:rPr lang="en-US" smtClean="0"/>
               <a:t>‹#›</a:t>
             </a:fld>
@@ -3345,7 +3773,7 @@
     </p:spTree>
     <p:extLst>
       <p:ext uri="{BB962C8B-B14F-4D97-AF65-F5344CB8AC3E}">
-        <p14:creationId xmlns:p14="http://schemas.microsoft.com/office/powerpoint/2010/main" val="3664168863"/>
+        <p14:creationId xmlns:p14="http://schemas.microsoft.com/office/powerpoint/2010/main" val="3540895647"/>
       </p:ext>
     </p:extLst>
   </p:cSld>
@@ -3384,15 +3812,15 @@
         </p:nvSpPr>
         <p:spPr>
           <a:xfrm>
-            <a:off x="693481" y="502920"/>
-            <a:ext cx="3247168" cy="1760220"/>
+            <a:off x="1792288" y="3600450"/>
+            <a:ext cx="5486400" cy="425054"/>
           </a:xfrm>
         </p:spPr>
         <p:txBody>
           <a:bodyPr anchor="b"/>
           <a:lstStyle>
-            <a:lvl1pPr>
-              <a:defRPr sz="3520"/>
+            <a:lvl1pPr algn="l">
+              <a:defRPr sz="1500" b="1"/>
             </a:lvl1pPr>
           </a:lstStyle>
           <a:p>
@@ -3400,7 +3828,6 @@
               <a:rPr lang="en-US"/>
               <a:t>Click to edit Master title style</a:t>
             </a:r>
-            <a:endParaRPr lang="en-US" dirty="0"/>
           </a:p>
         </p:txBody>
       </p:sp>
@@ -3408,7 +3835,7 @@
         <p:nvSpPr>
           <p:cNvPr id="3" name="Picture Placeholder 2"/>
           <p:cNvSpPr>
-            <a:spLocks noGrp="1" noChangeAspect="1"/>
+            <a:spLocks noGrp="1"/>
           </p:cNvSpPr>
           <p:nvPr>
             <p:ph type="pic" idx="1"/>
@@ -3416,56 +3843,52 @@
         </p:nvSpPr>
         <p:spPr>
           <a:xfrm>
-            <a:off x="4280179" y="1086169"/>
-            <a:ext cx="5096887" cy="5360988"/>
-          </a:xfrm>
-        </p:spPr>
-        <p:txBody>
-          <a:bodyPr anchor="t"/>
+            <a:off x="1792288" y="459581"/>
+            <a:ext cx="5486400" cy="3086100"/>
+          </a:xfrm>
+        </p:spPr>
+        <p:txBody>
+          <a:bodyPr/>
           <a:lstStyle>
             <a:lvl1pPr marL="0" indent="0">
               <a:buNone/>
-              <a:defRPr sz="3520"/>
+              <a:defRPr sz="2400"/>
             </a:lvl1pPr>
-            <a:lvl2pPr marL="502920" indent="0">
-              <a:buNone/>
-              <a:defRPr sz="3080"/>
+            <a:lvl2pPr marL="342900" indent="0">
+              <a:buNone/>
+              <a:defRPr sz="2100"/>
             </a:lvl2pPr>
-            <a:lvl3pPr marL="1005840" indent="0">
-              <a:buNone/>
-              <a:defRPr sz="2640"/>
+            <a:lvl3pPr marL="685800" indent="0">
+              <a:buNone/>
+              <a:defRPr sz="1800"/>
             </a:lvl3pPr>
-            <a:lvl4pPr marL="1508760" indent="0">
-              <a:buNone/>
-              <a:defRPr sz="2200"/>
+            <a:lvl4pPr marL="1028700" indent="0">
+              <a:buNone/>
+              <a:defRPr sz="1500"/>
             </a:lvl4pPr>
-            <a:lvl5pPr marL="2011680" indent="0">
-              <a:buNone/>
-              <a:defRPr sz="2200"/>
+            <a:lvl5pPr marL="1371600" indent="0">
+              <a:buNone/>
+              <a:defRPr sz="1500"/>
             </a:lvl5pPr>
-            <a:lvl6pPr marL="2514600" indent="0">
-              <a:buNone/>
-              <a:defRPr sz="2200"/>
+            <a:lvl6pPr marL="1714500" indent="0">
+              <a:buNone/>
+              <a:defRPr sz="1500"/>
             </a:lvl6pPr>
-            <a:lvl7pPr marL="3017520" indent="0">
-              <a:buNone/>
-              <a:defRPr sz="2200"/>
+            <a:lvl7pPr marL="2057400" indent="0">
+              <a:buNone/>
+              <a:defRPr sz="1500"/>
             </a:lvl7pPr>
-            <a:lvl8pPr marL="3520440" indent="0">
-              <a:buNone/>
-              <a:defRPr sz="2200"/>
+            <a:lvl8pPr marL="2400300" indent="0">
+              <a:buNone/>
+              <a:defRPr sz="1500"/>
             </a:lvl8pPr>
-            <a:lvl9pPr marL="4023360" indent="0">
-              <a:buNone/>
-              <a:defRPr sz="2200"/>
+            <a:lvl9pPr marL="2743200" indent="0">
+              <a:buNone/>
+              <a:defRPr sz="1500"/>
             </a:lvl9pPr>
           </a:lstStyle>
           <a:p>
-            <a:r>
-              <a:rPr lang="en-US"/>
-              <a:t>Click icon to add picture</a:t>
-            </a:r>
-            <a:endParaRPr lang="en-US" dirty="0"/>
+            <a:endParaRPr lang="en-US"/>
           </a:p>
         </p:txBody>
       </p:sp>
@@ -3481,56 +3904,54 @@
         </p:nvSpPr>
         <p:spPr>
           <a:xfrm>
-            <a:off x="693481" y="2263140"/>
-            <a:ext cx="3247168" cy="4192747"/>
-          </a:xfrm>
-        </p:spPr>
-        <p:txBody>
-          <a:bodyPr>
-            <a:normAutofit/>
-          </a:bodyPr>
+            <a:off x="1792288" y="4025503"/>
+            <a:ext cx="5486400" cy="603647"/>
+          </a:xfrm>
+        </p:spPr>
+        <p:txBody>
+          <a:bodyPr/>
           <a:lstStyle>
             <a:lvl1pPr marL="0" indent="0">
               <a:buNone/>
-              <a:defRPr sz="1400"/>
+              <a:defRPr sz="1050"/>
             </a:lvl1pPr>
-            <a:lvl2pPr marL="502920" indent="0">
-              <a:buNone/>
-              <a:defRPr sz="1540"/>
+            <a:lvl2pPr marL="342900" indent="0">
+              <a:buNone/>
+              <a:defRPr sz="900"/>
             </a:lvl2pPr>
-            <a:lvl3pPr marL="1005840" indent="0">
-              <a:buNone/>
-              <a:defRPr sz="1320"/>
+            <a:lvl3pPr marL="685800" indent="0">
+              <a:buNone/>
+              <a:defRPr sz="750"/>
             </a:lvl3pPr>
-            <a:lvl4pPr marL="1508760" indent="0">
-              <a:buNone/>
-              <a:defRPr sz="1100"/>
+            <a:lvl4pPr marL="1028700" indent="0">
+              <a:buNone/>
+              <a:defRPr sz="675"/>
             </a:lvl4pPr>
-            <a:lvl5pPr marL="2011680" indent="0">
-              <a:buNone/>
-              <a:defRPr sz="1100"/>
+            <a:lvl5pPr marL="1371600" indent="0">
+              <a:buNone/>
+              <a:defRPr sz="675"/>
             </a:lvl5pPr>
-            <a:lvl6pPr marL="2514600" indent="0">
-              <a:buNone/>
-              <a:defRPr sz="1100"/>
+            <a:lvl6pPr marL="1714500" indent="0">
+              <a:buNone/>
+              <a:defRPr sz="675"/>
             </a:lvl6pPr>
-            <a:lvl7pPr marL="3017520" indent="0">
-              <a:buNone/>
-              <a:defRPr sz="1100"/>
+            <a:lvl7pPr marL="2057400" indent="0">
+              <a:buNone/>
+              <a:defRPr sz="675"/>
             </a:lvl7pPr>
-            <a:lvl8pPr marL="3520440" indent="0">
-              <a:buNone/>
-              <a:defRPr sz="1100"/>
+            <a:lvl8pPr marL="2400300" indent="0">
+              <a:buNone/>
+              <a:defRPr sz="675"/>
             </a:lvl8pPr>
-            <a:lvl9pPr marL="4023360" indent="0">
-              <a:buNone/>
-              <a:defRPr sz="1100"/>
+            <a:lvl9pPr marL="2743200" indent="0">
+              <a:buNone/>
+              <a:defRPr sz="675"/>
             </a:lvl9pPr>
           </a:lstStyle>
           <a:p>
             <a:pPr lvl="0"/>
             <a:r>
-              <a:rPr lang="en-US" dirty="0"/>
+              <a:rPr lang="en-US"/>
               <a:t>Click to edit Master text styles</a:t>
             </a:r>
           </a:p>
@@ -3551,9 +3972,9 @@
           <a:bodyPr/>
           <a:lstStyle/>
           <a:p>
-            <a:fld id="{B35CD269-42B5-4067-A42B-F772DEB587E1}" type="datetimeFigureOut">
+            <a:fld id="{241EB5C9-1307-BA42-ABA2-0BC069CD8E7F}" type="datetimeFigureOut">
               <a:rPr lang="en-US" smtClean="0"/>
-              <a:t>6/28/23</a:t>
+              <a:t>1/2/22</a:t>
             </a:fld>
             <a:endParaRPr lang="en-US"/>
           </a:p>
@@ -3593,7 +4014,7 @@
           <a:bodyPr/>
           <a:lstStyle/>
           <a:p>
-            <a:fld id="{141F55E9-9A83-45A8-A91F-A02EDC2352D1}" type="slidenum">
+            <a:fld id="{C5EF2332-01BF-834F-8236-50238282D533}" type="slidenum">
               <a:rPr lang="en-US" smtClean="0"/>
               <a:t>‹#›</a:t>
             </a:fld>
@@ -3604,7 +4025,7 @@
     </p:spTree>
     <p:extLst>
       <p:ext uri="{BB962C8B-B14F-4D97-AF65-F5344CB8AC3E}">
-        <p14:creationId xmlns:p14="http://schemas.microsoft.com/office/powerpoint/2010/main" val="29570544"/>
+        <p14:creationId xmlns:p14="http://schemas.microsoft.com/office/powerpoint/2010/main" val="3566899855"/>
       </p:ext>
     </p:extLst>
   </p:cSld>
@@ -3741,8 +4162,8 @@
         </p:nvSpPr>
         <p:spPr>
           <a:xfrm>
-            <a:off x="692170" y="6991986"/>
-            <a:ext cx="2265283" cy="401638"/>
+            <a:off x="7436501" y="7187184"/>
+            <a:ext cx="2265283" cy="182880"/>
           </a:xfrm>
           <a:prstGeom prst="rect">
             <a:avLst/>
@@ -3751,22 +4172,24 @@
         <p:txBody>
           <a:bodyPr anchor="ctr" bIns="45720" lIns="91440" rIns="91440" rtlCol="0" tIns="45720" vert="horz"/>
           <a:lstStyle>
-            <a:lvl1pPr algn="l">
-              <a:defRPr sz="1320">
+            <a:lvl1pPr algn="r">
+              <a:defRPr sz="1000">
                 <a:solidFill>
                   <a:schemeClr val="tx1">
                     <a:tint val="75000"/>
                   </a:schemeClr>
                 </a:solidFill>
+                <a:latin charset="0" panose="020F0502020204030204" pitchFamily="34" typeface="Calibri"/>
+                <a:cs charset="0" panose="020F0502020204030204" pitchFamily="34" typeface="Calibri"/>
               </a:defRPr>
             </a:lvl1pPr>
           </a:lstStyle>
           <a:p>
-            <a:fld id="{B35CD269-42B5-4067-A42B-F772DEB587E1}" type="datetimeFigureOut">
+            <a:fld id="{67EBFAA5-59A6-6A47-9A5E-31B9D2AF54C8}" type="datetime4">
               <a:rPr lang="en-US" smtClean="0"/>
-              <a:t>6/28/23</a:t>
+              <a:t>July 5, 2023</a:t>
             </a:fld>
-            <a:endParaRPr lang="en-US"/>
+            <a:endParaRPr dirty="0" lang="en-US"/>
           </a:p>
         </p:txBody>
       </p:sp>
@@ -3782,8 +4205,8 @@
         </p:nvSpPr>
         <p:spPr>
           <a:xfrm>
-            <a:off x="3335000" y="6991986"/>
-            <a:ext cx="3397925" cy="401638"/>
+            <a:off x="3335000" y="7187184"/>
+            <a:ext cx="3397925" cy="182880"/>
           </a:xfrm>
           <a:prstGeom prst="rect">
             <a:avLst/>
@@ -3793,17 +4216,19 @@
           <a:bodyPr anchor="ctr" bIns="45720" lIns="91440" rIns="91440" rtlCol="0" tIns="45720" vert="horz"/>
           <a:lstStyle>
             <a:lvl1pPr algn="ctr">
-              <a:defRPr sz="1320">
+              <a:defRPr sz="1000">
                 <a:solidFill>
                   <a:schemeClr val="tx1">
                     <a:tint val="75000"/>
                   </a:schemeClr>
                 </a:solidFill>
+                <a:latin charset="0" panose="020F0502020204030204" pitchFamily="34" typeface="Calibri"/>
+                <a:cs charset="0" panose="020F0502020204030204" pitchFamily="34" typeface="Calibri"/>
               </a:defRPr>
             </a:lvl1pPr>
           </a:lstStyle>
           <a:p>
-            <a:endParaRPr lang="en-US"/>
+            <a:endParaRPr dirty="0" lang="en-US"/>
           </a:p>
         </p:txBody>
       </p:sp>
@@ -3819,8 +4244,8 @@
         </p:nvSpPr>
         <p:spPr>
           <a:xfrm>
-            <a:off x="7110472" y="6991986"/>
-            <a:ext cx="2265283" cy="401638"/>
+            <a:off x="356616" y="7187184"/>
+            <a:ext cx="2265283" cy="182880"/>
           </a:xfrm>
           <a:prstGeom prst="rect">
             <a:avLst/>
@@ -3829,22 +4254,25 @@
         <p:txBody>
           <a:bodyPr anchor="ctr" bIns="45720" lIns="91440" rIns="91440" rtlCol="0" tIns="45720" vert="horz"/>
           <a:lstStyle>
-            <a:lvl1pPr algn="r">
-              <a:defRPr sz="1320">
+            <a:lvl1pPr algn="l">
+              <a:defRPr sz="1000">
                 <a:solidFill>
                   <a:schemeClr val="tx1">
                     <a:tint val="75000"/>
                   </a:schemeClr>
                 </a:solidFill>
+                <a:latin charset="0" panose="020F0502020204030204" pitchFamily="34" typeface="Calibri"/>
+                <a:cs charset="0" panose="020F0502020204030204" pitchFamily="34" typeface="Calibri"/>
               </a:defRPr>
             </a:lvl1pPr>
           </a:lstStyle>
           <a:p>
             <a:fld id="{141F55E9-9A83-45A8-A91F-A02EDC2352D1}" type="slidenum">
               <a:rPr lang="en-US" smtClean="0"/>
+              <a:pPr/>
               <a:t>‹#›</a:t>
             </a:fld>
-            <a:endParaRPr lang="en-US"/>
+            <a:endParaRPr dirty="0" lang="en-US"/>
           </a:p>
         </p:txBody>
       </p:sp>
@@ -3861,14 +4289,11 @@
     <p:sldLayoutId id="2147483686" r:id="rId2"/>
     <p:sldLayoutId id="2147483687" r:id="rId3"/>
     <p:sldLayoutId id="2147483688" r:id="rId4"/>
-    <p:sldLayoutId id="2147483689" r:id="rId5"/>
-    <p:sldLayoutId id="2147483690" r:id="rId6"/>
-    <p:sldLayoutId id="2147483691" r:id="rId7"/>
-    <p:sldLayoutId id="2147483692" r:id="rId8"/>
-    <p:sldLayoutId id="2147483693" r:id="rId9"/>
-    <p:sldLayoutId id="2147483694" r:id="rId10"/>
-    <p:sldLayoutId id="2147483695" r:id="rId11"/>
+    <p:sldLayoutId id="2147483697" r:id="rId5"/>
+    <p:sldLayoutId id="2147483691" r:id="rId6"/>
+    <p:sldLayoutId id="2147483692" r:id="rId7"/>
   </p:sldLayoutIdLst>
+  <p:hf ftr="0" hdr="0" sldNum="0"/>
   <p:txStyles>
     <p:titleStyle>
       <a:lvl1pPr algn="l" defTabSz="1005840" eaLnBrk="1" hangingPunct="1" latinLnBrk="0" rtl="0">
@@ -3881,7 +4306,10 @@
         <a:buNone/>
         <a:defRPr b="1" kern="1200" sz="2800">
           <a:solidFill>
-            <a:schemeClr val="tx1"/>
+            <a:schemeClr val="tx1">
+              <a:lumMod val="85000"/>
+              <a:lumOff val="15000"/>
+            </a:schemeClr>
           </a:solidFill>
           <a:latin charset="0" panose="020F0502020204030204" pitchFamily="34" typeface="Calibri"/>
           <a:ea typeface="+mj-ea"/>
@@ -3901,7 +4329,10 @@
         <a:buChar char="•"/>
         <a:defRPr kern="1200" sz="1400">
           <a:solidFill>
-            <a:schemeClr val="tx1"/>
+            <a:schemeClr val="tx1">
+              <a:lumMod val="85000"/>
+              <a:lumOff val="15000"/>
+            </a:schemeClr>
           </a:solidFill>
           <a:latin charset="0" panose="020F0502020204030204" pitchFamily="34" typeface="Calibri"/>
           <a:ea typeface="+mn-ea"/>
@@ -3919,7 +4350,10 @@
         <a:buChar char="§"/>
         <a:defRPr kern="1200" sz="1400">
           <a:solidFill>
-            <a:schemeClr val="tx1"/>
+            <a:schemeClr val="tx1">
+              <a:lumMod val="85000"/>
+              <a:lumOff val="15000"/>
+            </a:schemeClr>
           </a:solidFill>
           <a:latin charset="0" panose="020F0502020204030204" pitchFamily="34" typeface="Calibri"/>
           <a:ea typeface="+mn-ea"/>
@@ -3937,7 +4371,10 @@
         <a:buChar char="-"/>
         <a:defRPr kern="1200" sz="1400">
           <a:solidFill>
-            <a:schemeClr val="tx1"/>
+            <a:schemeClr val="tx1">
+              <a:lumMod val="85000"/>
+              <a:lumOff val="15000"/>
+            </a:schemeClr>
           </a:solidFill>
           <a:latin charset="0" panose="020F0502020204030204" pitchFamily="34" typeface="Calibri"/>
           <a:ea typeface="+mn-ea"/>
@@ -3955,7 +4392,10 @@
         <a:buChar char="•"/>
         <a:defRPr kern="1200" sz="1400">
           <a:solidFill>
-            <a:schemeClr val="tx1"/>
+            <a:schemeClr val="tx1">
+              <a:lumMod val="85000"/>
+              <a:lumOff val="15000"/>
+            </a:schemeClr>
           </a:solidFill>
           <a:latin charset="0" panose="020F0502020204030204" pitchFamily="34" typeface="Calibri"/>
           <a:ea typeface="+mn-ea"/>
@@ -3973,7 +4413,10 @@
         <a:buChar char="•"/>
         <a:defRPr kern="1200" sz="1400">
           <a:solidFill>
-            <a:schemeClr val="tx1"/>
+            <a:schemeClr val="tx1">
+              <a:lumMod val="85000"/>
+              <a:lumOff val="15000"/>
+            </a:schemeClr>
           </a:solidFill>
           <a:latin charset="0" panose="020F0502020204030204" pitchFamily="34" typeface="Calibri"/>
           <a:ea typeface="+mn-ea"/>
@@ -4181,8 +4624,8 @@
         </p:nvSpPr>
         <p:spPr>
           <a:xfrm>
-            <a:off x="356616" y="1261872"/>
-            <a:ext cx="9354312" cy="722376"/>
+            <a:off x="356616" y="2795958"/>
+            <a:ext cx="6601232" cy="722376"/>
           </a:xfrm>
         </p:spPr>
         <p:txBody>
@@ -4211,8 +4654,8 @@
         </p:nvSpPr>
         <p:spPr>
           <a:xfrm>
-            <a:off x="356616" y="2139696"/>
-            <a:ext cx="9354312" cy="356616"/>
+            <a:off x="356616" y="3810416"/>
+            <a:ext cx="6601232" cy="356616"/>
           </a:xfrm>
         </p:spPr>
         <p:txBody>
@@ -4226,8 +4669,51 @@
             <a:br/>
             <a:r>
               <a:rPr/>
-              <a:t>InhoPark</a:t>
-            </a:r>
+              <a:t>Inho Park</a:t>
+            </a:r>
+          </a:p>
+        </p:txBody>
+      </p:sp>
+      <p:sp>
+        <p:nvSpPr>
+          <p:cNvPr id="4" name="Date Placeholder 3"/>
+          <p:cNvSpPr>
+            <a:spLocks noGrp="1"/>
+          </p:cNvSpPr>
+          <p:nvPr>
+            <p:ph idx="10" sz="half" type="dt"/>
+          </p:nvPr>
+        </p:nvSpPr>
+        <p:spPr>
+          <a:xfrm>
+            <a:off x="356616" y="4120525"/>
+            <a:ext cx="2265283" cy="356616"/>
+          </a:xfrm>
+          <a:prstGeom prst="rect">
+            <a:avLst/>
+          </a:prstGeom>
+        </p:spPr>
+        <p:txBody>
+          <a:bodyPr anchor="t"/>
+          <a:lstStyle>
+            <a:lvl1pPr algn="l">
+              <a:defRPr sz="2000">
+                <a:solidFill>
+                  <a:schemeClr val="bg1">
+                    <a:lumMod val="85000"/>
+                  </a:schemeClr>
+                </a:solidFill>
+                <a:latin charset="0" panose="020F0502020204030204" pitchFamily="34" typeface="Calibri"/>
+                <a:cs charset="0" panose="020F0502020204030204" pitchFamily="34" typeface="Calibri"/>
+              </a:defRPr>
+            </a:lvl1pPr>
+          </a:lstStyle>
+          <a:p>
+            <a:fld id="{DA2CBBD1-0BD6-7B4F-AC90-15CD32335A31}" type="datetime4">
+              <a:rPr lang="en-US" smtClean="0"/>
+              <a:t>July 5, 2023</a:t>
+            </a:fld>
+            <a:endParaRPr dirty="0" lang="en-US"/>
           </a:p>
         </p:txBody>
       </p:sp>
@@ -4255,15 +4741,26 @@
       </p:grpSpPr>
       <p:sp>
         <p:nvSpPr>
-          <p:cNvPr id="2" name="Title 1"/>
-          <p:cNvSpPr>
-            <a:spLocks noGrp="1"/>
-          </p:cNvSpPr>
-          <p:nvPr>
-            <p:ph type="title"/>
-          </p:nvPr>
-        </p:nvSpPr>
-        <p:spPr/>
+          <p:cNvPr id="12" name="Title 1">
+            <a:extLst>
+              <a:ext uri="{FF2B5EF4-FFF2-40B4-BE49-F238E27FC236}">
+                <a16:creationId xmlns:a16="http://schemas.microsoft.com/office/drawing/2014/main" id="{F813C0F5-0D35-693F-D383-750FEB585D56}"/>
+              </a:ext>
+            </a:extLst>
+          </p:cNvPr>
+          <p:cNvSpPr>
+            <a:spLocks noGrp="1"/>
+          </p:cNvSpPr>
+          <p:nvPr>
+            <p:ph type="ctrTitle"/>
+          </p:nvPr>
+        </p:nvSpPr>
+        <p:spPr>
+          <a:xfrm>
+            <a:off x="356616" y="3956065"/>
+            <a:ext cx="6601968" cy="722376"/>
+          </a:xfrm>
+        </p:spPr>
         <p:txBody>
           <a:bodyPr/>
           <a:lstStyle/>
@@ -4273,41 +4770,11 @@
             </a:pPr>
             <a:r>
               <a:rPr/>
-              <a:t>Adding mermaid</a:t>
-            </a:r>
-          </a:p>
-        </p:txBody>
-      </p:sp>
-      <p:pic>
-        <p:nvPicPr>
-          <p:cNvPr descr="study1_files\figure-pptx\mermaid-figure-1.png" id="0" name="Picture 1"/>
-          <p:cNvPicPr>
-            <a:picLocks noGrp="1" noChangeAspect="1"/>
-          </p:cNvPicPr>
-          <p:nvPr/>
-        </p:nvPicPr>
-        <p:blipFill>
-          <a:blip r:embed="rId2"/>
-          <a:stretch>
-            <a:fillRect/>
-          </a:stretch>
-        </p:blipFill>
-        <p:spPr bwMode="auto">
-          <a:xfrm>
-            <a:off x="355600" y="2857500"/>
-            <a:ext cx="9334500" cy="2273300"/>
-          </a:xfrm>
-          <a:prstGeom prst="rect">
-            <a:avLst/>
-          </a:prstGeom>
-          <a:noFill/>
-          <a:ln w="9525">
-            <a:noFill/>
-            <a:headEnd/>
-            <a:tailEnd/>
-          </a:ln>
-        </p:spPr>
-      </p:pic>
+              <a:t>End of Example Slides</a:t>
+            </a:r>
+          </a:p>
+        </p:txBody>
+      </p:sp>
     </p:spTree>
   </p:cSld>
 </p:sld>
@@ -4350,41 +4817,76 @@
             </a:pPr>
             <a:r>
               <a:rPr/>
-              <a:t>Adding graphviz</a:t>
-            </a:r>
-          </a:p>
-        </p:txBody>
-      </p:sp>
-      <p:pic>
-        <p:nvPicPr>
-          <p:cNvPr descr="study1_files\figure-pptx\dot-figure-1.png" id="0" name="Picture 1"/>
-          <p:cNvPicPr>
-            <a:picLocks noGrp="1" noChangeAspect="1"/>
-          </p:cNvPicPr>
-          <p:nvPr/>
-        </p:nvPicPr>
-        <p:blipFill>
-          <a:blip r:embed="rId2"/>
-          <a:stretch>
-            <a:fillRect/>
-          </a:stretch>
-        </p:blipFill>
-        <p:spPr bwMode="auto">
-          <a:xfrm>
-            <a:off x="1079500" y="1371600"/>
-            <a:ext cx="7899400" cy="5257800"/>
-          </a:xfrm>
-          <a:prstGeom prst="rect">
-            <a:avLst/>
-          </a:prstGeom>
-          <a:noFill/>
-          <a:ln w="9525">
-            <a:noFill/>
-            <a:headEnd/>
-            <a:tailEnd/>
-          </a:ln>
-        </p:spPr>
-      </p:pic>
+              <a:t>Example - Disgrams</a:t>
+            </a:r>
+          </a:p>
+        </p:txBody>
+      </p:sp>
+      <p:sp>
+        <p:nvSpPr>
+          <p:cNvPr id="3" name="Content Placeholder 2"/>
+          <p:cNvSpPr>
+            <a:spLocks noGrp="1"/>
+          </p:cNvSpPr>
+          <p:nvPr>
+            <p:ph idx="1"/>
+          </p:nvPr>
+        </p:nvSpPr>
+        <p:spPr/>
+        <p:txBody>
+          <a:bodyPr/>
+          <a:lstStyle/>
+          <a:p>
+            <a:pPr lvl="0"/>
+            <a:r>
+              <a:rPr/>
+              <a:t>The two slides highlight diagrams:</a:t>
+            </a:r>
+          </a:p>
+          <a:p>
+            <a:pPr lvl="1"/>
+            <a:r>
+              <a:rPr/>
+              <a:t>see: https://quarto.org/docs/authoring/diagrams.html#overview</a:t>
+            </a:r>
+          </a:p>
+          <a:p>
+            <a:pPr lvl="0"/>
+            <a:r>
+              <a:rPr/>
+              <a:t>Mermaid diagrams:</a:t>
+            </a:r>
+          </a:p>
+          <a:p>
+            <a:pPr lvl="1"/>
+            <a:r>
+              <a:rPr/>
+              <a:t>https://mermaid.js.org/config/Tutorials.html</a:t>
+            </a:r>
+          </a:p>
+          <a:p>
+            <a:pPr lvl="0"/>
+            <a:r>
+              <a:rPr/>
+              <a:t>GraphViz diagrams:</a:t>
+            </a:r>
+          </a:p>
+          <a:p>
+            <a:pPr lvl="1"/>
+            <a:r>
+              <a:rPr/>
+              <a:t>https://graphviz.org/gallery/</a:t>
+            </a:r>
+          </a:p>
+          <a:p>
+            <a:pPr lvl="0"/>
+            <a:r>
+              <a:rPr/>
+              <a:t>IT WOULD BE NICE to create styles (using the mermaid and graphviz) instructions that match with the presentation styles, so a user doesn’t need to worry about styles, we just go for it!</a:t>
+            </a:r>
+          </a:p>
+        </p:txBody>
+      </p:sp>
     </p:spTree>
   </p:cSld>
 </p:sld>
@@ -4427,51 +4929,205 @@
             </a:pPr>
             <a:r>
               <a:rPr/>
-              <a:t>OK - now add some table examples</a:t>
-            </a:r>
-          </a:p>
-        </p:txBody>
-      </p:sp>
-      <p:sp>
-        <p:nvSpPr>
-          <p:cNvPr id="3" name="Content Placeholder 2"/>
-          <p:cNvSpPr>
-            <a:spLocks noGrp="1"/>
-          </p:cNvSpPr>
-          <p:nvPr>
-            <p:ph idx="1"/>
-          </p:nvPr>
-        </p:nvSpPr>
-        <p:spPr/>
-        <p:txBody>
-          <a:bodyPr/>
-          <a:lstStyle/>
-          <a:p>
-            <a:pPr lvl="0" indent="0" marL="0">
-              <a:buNone/>
-            </a:pPr>
-            <a:r>
-              <a:rPr/>
-              <a:t>In many cases, we don’t know exactly what will exactly work in Powerpoint.</a:t>
-            </a:r>
-          </a:p>
-          <a:p>
-            <a:pPr lvl="0" indent="0" marL="0">
-              <a:buNone/>
-            </a:pPr>
-            <a:r>
-              <a:rPr/>
-              <a:t>Add more slides to study what will and won’t work, and provide examples for others to leverage.</a:t>
-            </a:r>
-          </a:p>
-        </p:txBody>
-      </p:sp>
+              <a:t>Adding mermaid</a:t>
+            </a:r>
+          </a:p>
+        </p:txBody>
+      </p:sp>
+      <p:pic>
+        <p:nvPicPr>
+          <p:cNvPr descr="study1_files/figure-pptx/mermaid-figure-1.png" id="0" name="Picture 1"/>
+          <p:cNvPicPr>
+            <a:picLocks noGrp="1" noChangeAspect="1"/>
+          </p:cNvPicPr>
+          <p:nvPr/>
+        </p:nvPicPr>
+        <p:blipFill>
+          <a:blip r:embed="rId2"/>
+          <a:stretch>
+            <a:fillRect/>
+          </a:stretch>
+        </p:blipFill>
+        <p:spPr bwMode="auto">
+          <a:xfrm>
+            <a:off x="355600" y="2857500"/>
+            <a:ext cx="9334500" cy="2273300"/>
+          </a:xfrm>
+          <a:prstGeom prst="rect">
+            <a:avLst/>
+          </a:prstGeom>
+          <a:noFill/>
+          <a:ln w="9525">
+            <a:noFill/>
+            <a:headEnd/>
+            <a:tailEnd/>
+          </a:ln>
+        </p:spPr>
+      </p:pic>
     </p:spTree>
   </p:cSld>
 </p:sld>
 </file>
 
 <file path=ppt/slides/slide13.xml><?xml version="1.0" encoding="utf-8"?>
+<p:sld xmlns:a="http://schemas.openxmlformats.org/drawingml/2006/main" xmlns:r="http://schemas.openxmlformats.org/officeDocument/2006/relationships" xmlns:p="http://schemas.openxmlformats.org/presentationml/2006/main">
+  <p:cSld>
+    <p:spTree>
+      <p:nvGrpSpPr>
+        <p:cNvPr id="1" name=""/>
+        <p:cNvGrpSpPr/>
+        <p:nvPr/>
+      </p:nvGrpSpPr>
+      <p:grpSpPr>
+        <a:xfrm>
+          <a:off x="0" y="0"/>
+          <a:ext cx="0" cy="0"/>
+          <a:chOff x="0" y="0"/>
+          <a:chExt cx="0" cy="0"/>
+        </a:xfrm>
+      </p:grpSpPr>
+      <p:sp>
+        <p:nvSpPr>
+          <p:cNvPr id="2" name="Title 1"/>
+          <p:cNvSpPr>
+            <a:spLocks noGrp="1"/>
+          </p:cNvSpPr>
+          <p:nvPr>
+            <p:ph type="title"/>
+          </p:nvPr>
+        </p:nvSpPr>
+        <p:spPr/>
+        <p:txBody>
+          <a:bodyPr/>
+          <a:lstStyle/>
+          <a:p>
+            <a:pPr lvl="0" indent="0" marL="0">
+              <a:buNone/>
+            </a:pPr>
+            <a:r>
+              <a:rPr/>
+              <a:t>Adding graphviz</a:t>
+            </a:r>
+          </a:p>
+        </p:txBody>
+      </p:sp>
+      <p:pic>
+        <p:nvPicPr>
+          <p:cNvPr descr="study1_files/figure-pptx/dot-figure-1.png" id="0" name="Picture 1"/>
+          <p:cNvPicPr>
+            <a:picLocks noGrp="1" noChangeAspect="1"/>
+          </p:cNvPicPr>
+          <p:nvPr/>
+        </p:nvPicPr>
+        <p:blipFill>
+          <a:blip r:embed="rId2"/>
+          <a:stretch>
+            <a:fillRect/>
+          </a:stretch>
+        </p:blipFill>
+        <p:spPr bwMode="auto">
+          <a:xfrm>
+            <a:off x="1079500" y="1371600"/>
+            <a:ext cx="7899400" cy="5257800"/>
+          </a:xfrm>
+          <a:prstGeom prst="rect">
+            <a:avLst/>
+          </a:prstGeom>
+          <a:noFill/>
+          <a:ln w="9525">
+            <a:noFill/>
+            <a:headEnd/>
+            <a:tailEnd/>
+          </a:ln>
+        </p:spPr>
+      </p:pic>
+    </p:spTree>
+  </p:cSld>
+</p:sld>
+</file>
+
+<file path=ppt/slides/slide14.xml><?xml version="1.0" encoding="utf-8"?>
+<p:sld xmlns:a="http://schemas.openxmlformats.org/drawingml/2006/main" xmlns:r="http://schemas.openxmlformats.org/officeDocument/2006/relationships" xmlns:p="http://schemas.openxmlformats.org/presentationml/2006/main">
+  <p:cSld>
+    <p:spTree>
+      <p:nvGrpSpPr>
+        <p:cNvPr id="1" name=""/>
+        <p:cNvGrpSpPr/>
+        <p:nvPr/>
+      </p:nvGrpSpPr>
+      <p:grpSpPr>
+        <a:xfrm>
+          <a:off x="0" y="0"/>
+          <a:ext cx="0" cy="0"/>
+          <a:chOff x="0" y="0"/>
+          <a:chExt cx="0" cy="0"/>
+        </a:xfrm>
+      </p:grpSpPr>
+      <p:sp>
+        <p:nvSpPr>
+          <p:cNvPr id="2" name="Title 1"/>
+          <p:cNvSpPr>
+            <a:spLocks noGrp="1"/>
+          </p:cNvSpPr>
+          <p:nvPr>
+            <p:ph type="title"/>
+          </p:nvPr>
+        </p:nvSpPr>
+        <p:spPr/>
+        <p:txBody>
+          <a:bodyPr/>
+          <a:lstStyle/>
+          <a:p>
+            <a:pPr lvl="0" indent="0" marL="0">
+              <a:buNone/>
+            </a:pPr>
+            <a:r>
+              <a:rPr/>
+              <a:t>OK - now add some table examples</a:t>
+            </a:r>
+          </a:p>
+        </p:txBody>
+      </p:sp>
+      <p:sp>
+        <p:nvSpPr>
+          <p:cNvPr id="3" name="Content Placeholder 2"/>
+          <p:cNvSpPr>
+            <a:spLocks noGrp="1"/>
+          </p:cNvSpPr>
+          <p:nvPr>
+            <p:ph idx="1"/>
+          </p:nvPr>
+        </p:nvSpPr>
+        <p:spPr/>
+        <p:txBody>
+          <a:bodyPr/>
+          <a:lstStyle/>
+          <a:p>
+            <a:pPr lvl="0" indent="0" marL="0">
+              <a:buNone/>
+            </a:pPr>
+            <a:r>
+              <a:rPr/>
+              <a:t>In many cases, we don’t know exactly what will exactly work in Powerpoint.</a:t>
+            </a:r>
+          </a:p>
+          <a:p>
+            <a:pPr lvl="0" indent="0" marL="0">
+              <a:buNone/>
+            </a:pPr>
+            <a:r>
+              <a:rPr/>
+              <a:t>Add more slides to study what will and won’t work, and provide examples for others to leverage.</a:t>
+            </a:r>
+          </a:p>
+        </p:txBody>
+      </p:sp>
+    </p:spTree>
+  </p:cSld>
+</p:sld>
+</file>
+
+<file path=ppt/slides/slide15.xml><?xml version="1.0" encoding="utf-8"?>
 <p:sld xmlns:a="http://schemas.openxmlformats.org/drawingml/2006/main" xmlns:r="http://schemas.openxmlformats.org/officeDocument/2006/relationships" xmlns:p="http://schemas.openxmlformats.org/presentationml/2006/main">
   <p:cSld>
     <p:spTree>
@@ -4530,7 +5186,7 @@
             </a:pPr>
             <a:r>
               <a:rPr/>
-              <a:t>Example - Title and content (2)</a:t>
+              <a:t>Title and Content (2)</a:t>
             </a:r>
           </a:p>
         </p:txBody>
@@ -4620,18 +5276,24 @@
       </p:grpSpPr>
       <p:sp>
         <p:nvSpPr>
-          <p:cNvPr id="2" name="Title 1"/>
-          <p:cNvSpPr>
-            <a:spLocks noGrp="1"/>
-          </p:cNvSpPr>
-          <p:nvPr>
-            <p:ph type="title"/>
+          <p:cNvPr id="12" name="Title 1">
+            <a:extLst>
+              <a:ext uri="{FF2B5EF4-FFF2-40B4-BE49-F238E27FC236}">
+                <a16:creationId xmlns:a16="http://schemas.microsoft.com/office/drawing/2014/main" id="{F813C0F5-0D35-693F-D383-750FEB585D56}"/>
+              </a:ext>
+            </a:extLst>
+          </p:cNvPr>
+          <p:cNvSpPr>
+            <a:spLocks noGrp="1"/>
+          </p:cNvSpPr>
+          <p:nvPr>
+            <p:ph type="ctrTitle"/>
           </p:nvPr>
         </p:nvSpPr>
         <p:spPr>
           <a:xfrm>
-            <a:off x="686927" y="1880713"/>
-            <a:ext cx="8683585" cy="3138011"/>
+            <a:off x="356616" y="3956065"/>
+            <a:ext cx="6601968" cy="722376"/>
           </a:xfrm>
         </p:spPr>
         <p:txBody>
@@ -4643,7 +5305,7 @@
             </a:pPr>
             <a:r>
               <a:rPr/>
-              <a:t>Example - Section Header (3)</a:t>
+              <a:t>Section Header (3)</a:t>
             </a:r>
           </a:p>
         </p:txBody>
@@ -4680,12 +5342,7 @@
             <p:ph type="title"/>
           </p:nvPr>
         </p:nvSpPr>
-        <p:spPr>
-          <a:xfrm>
-            <a:off x="693481" y="401639"/>
-            <a:ext cx="8683585" cy="1458119"/>
-          </a:xfrm>
-        </p:spPr>
+        <p:spPr/>
         <p:txBody>
           <a:bodyPr/>
           <a:lstStyle/>
@@ -4695,19 +5352,19 @@
             </a:pPr>
             <a:r>
               <a:rPr/>
-              <a:t>Example - two content (4)</a:t>
-            </a:r>
-          </a:p>
-        </p:txBody>
-      </p:sp>
-      <p:sp>
-        <p:nvSpPr>
-          <p:cNvPr id="3" name="Text Placeholder 2"/>
-          <p:cNvSpPr>
-            <a:spLocks noGrp="1"/>
-          </p:cNvSpPr>
-          <p:nvPr>
-            <p:ph idx="1" type="body"/>
+              <a:t>Two Content with Text Only (4)</a:t>
+            </a:r>
+          </a:p>
+        </p:txBody>
+      </p:sp>
+      <p:sp>
+        <p:nvSpPr>
+          <p:cNvPr id="3" name="Content Placeholder 2"/>
+          <p:cNvSpPr>
+            <a:spLocks noGrp="1"/>
+          </p:cNvSpPr>
+          <p:nvPr>
+            <p:ph idx="1" sz="half"/>
           </p:nvPr>
         </p:nvSpPr>
         <p:spPr/>
@@ -4739,12 +5396,12 @@
       </p:sp>
       <p:sp>
         <p:nvSpPr>
-          <p:cNvPr id="5" name="Text Placeholder 4"/>
-          <p:cNvSpPr>
-            <a:spLocks noGrp="1"/>
-          </p:cNvSpPr>
-          <p:nvPr>
-            <p:ph idx="3" sz="quarter" type="body"/>
+          <p:cNvPr id="4" name="Content Placeholder 3"/>
+          <p:cNvSpPr>
+            <a:spLocks noGrp="1"/>
+          </p:cNvSpPr>
+          <p:nvPr>
+            <p:ph idx="2" sz="half"/>
           </p:nvPr>
         </p:nvSpPr>
         <p:spPr/>
@@ -4760,67 +5417,16 @@
             </a:pPr>
             <a:r>
               <a:rPr b="1"/>
-              <a:t>Column 2 - subtitle</a:t>
-            </a:r>
-          </a:p>
-        </p:txBody>
-      </p:sp>
-      <p:pic>
-        <p:nvPicPr>
-          <p:cNvPr descr="student-pictures-example.png" id="0" name="Picture 1"/>
-          <p:cNvPicPr>
-            <a:picLocks noGrp="1" noChangeAspect="1"/>
-          </p:cNvPicPr>
-          <p:nvPr/>
-        </p:nvPicPr>
-        <p:blipFill>
-          <a:blip r:embed="rId2"/>
-          <a:stretch>
-            <a:fillRect/>
-          </a:stretch>
-        </p:blipFill>
-        <p:spPr bwMode="auto">
-          <a:xfrm>
-            <a:off x="5803900" y="2743200"/>
-            <a:ext cx="2857500" cy="3543300"/>
-          </a:xfrm>
-          <a:prstGeom prst="rect">
-            <a:avLst/>
-          </a:prstGeom>
-          <a:noFill/>
-          <a:ln w="9525">
-            <a:noFill/>
-            <a:headEnd/>
-            <a:tailEnd/>
-          </a:ln>
-        </p:spPr>
-      </p:pic>
-      <p:sp>
-        <p:nvSpPr>
-          <p:cNvPr id="1" name="TextBox 3"/>
-          <p:cNvSpPr txBox="1"/>
-          <p:nvPr/>
-        </p:nvSpPr>
-        <p:spPr>
-          <a:xfrm>
-            <a:off x="5092700" y="6286500"/>
-            <a:ext cx="4279900" cy="508000"/>
-          </a:xfrm>
-          <a:prstGeom prst="rect">
-            <a:avLst/>
-          </a:prstGeom>
-          <a:noFill/>
-        </p:spPr>
-        <p:txBody>
-          <a:bodyPr/>
-          <a:lstStyle/>
-          <a:p>
-            <a:pPr lvl="0" indent="0" marL="0" algn="ctr">
+              <a:t>Column 2 - sub title</a:t>
+            </a:r>
+          </a:p>
+          <a:p>
+            <a:pPr lvl="0" indent="0" marL="0">
               <a:buNone/>
             </a:pPr>
             <a:r>
               <a:rPr/>
-              <a:t>title of figure</a:t>
+              <a:t>Lorem ipsum dolor sit amet, consectetur adipiscing elit. Donec vel ligula vel ligula sodales euismod. In commodo in nunc a faucibus. Fusce ut est vel neque ultricies tempus. Vivamus convallis ultrices diam, vel dignissim nibh dignissim non. Suspendisse aliquam in mauris et egestas. Aenean interdum pellentesque ligula ut laoreet. Nam eu augue sit amet ex consequat porttitor eget non risus. Duis dictum est eu placerat efficitur. In fermentum dictum lorem, eu vehicula dui semper a. Quisque ante erat, consequat non pellentesque in, maximus id dui. Maecenas mattis aliquet neque, vel ornare ex malesuada et.</a:t>
             </a:r>
           </a:p>
         </p:txBody>
@@ -4857,12 +5463,7 @@
             <p:ph type="title"/>
           </p:nvPr>
         </p:nvSpPr>
-        <p:spPr>
-          <a:xfrm>
-            <a:off x="693481" y="502920"/>
-            <a:ext cx="3247168" cy="1760220"/>
-          </a:xfrm>
-        </p:spPr>
+        <p:spPr/>
         <p:txBody>
           <a:bodyPr/>
           <a:lstStyle/>
@@ -4872,19 +5473,19 @@
             </a:pPr>
             <a:r>
               <a:rPr/>
-              <a:t>Example - Content with Caption (5)</a:t>
-            </a:r>
-          </a:p>
-        </p:txBody>
-      </p:sp>
-      <p:sp>
-        <p:nvSpPr>
-          <p:cNvPr id="4" name="Text Placeholder 3"/>
-          <p:cNvSpPr>
-            <a:spLocks noGrp="1"/>
-          </p:cNvSpPr>
-          <p:nvPr>
-            <p:ph idx="2" sz="half" type="body"/>
+              <a:t>Two Content with mix of Text &amp; Image (5)</a:t>
+            </a:r>
+          </a:p>
+        </p:txBody>
+      </p:sp>
+      <p:sp>
+        <p:nvSpPr>
+          <p:cNvPr id="3" name="Content Placeholder 2"/>
+          <p:cNvSpPr>
+            <a:spLocks noGrp="1"/>
+          </p:cNvSpPr>
+          <p:nvPr>
+            <p:ph idx="1" sz="half"/>
           </p:nvPr>
         </p:nvSpPr>
         <p:spPr/>
@@ -4909,16 +5510,7 @@
             </a:pPr>
             <a:r>
               <a:rPr/>
-              <a:t>This layout is used for any non-two-column slides which contain text followed by non-text (e.g. an image or a table)</a:t>
-            </a:r>
-          </a:p>
-          <a:p>
-            <a:pPr lvl="0" indent="0" marL="0">
-              <a:buNone/>
-            </a:pPr>
-            <a:r>
-              <a:rPr/>
-              <a:t>Lorem ipsum dolor sit amet, consectetur adipiscing elit. Donec vel ligula vel ligula sodales euismod. In commodo in nunc a faucibus. Fusce ut est vel neque ultricies tempus. Vivamus convallis ultrices diam, vel dignissim nibh dignissim non. Suspendisse aliquam in mauris et egestas. Aenean interdum pellentesque ligula ut laoreet. Nam eu augue sit amet ex consequat porttitor eget non risus. Duis dictum est eu placerat efficitur. In fermentum dictum lorem, eu vehicula dui semper a. Quisque ante erat, consequat non pellentesque in, maximus id dui. Maecenas mattis aliquet neque, vel ornare ex malesuada et.</a:t>
+              <a:t>Maecenas mattis aliquet neque, vel ornare ex malesuada et.Maecenas mattis aliquet neque, vel ornare ex malesuada et.Maecenas mattis aliquet neque, vel ornare ex malesuada et.</a:t>
             </a:r>
           </a:p>
         </p:txBody>
@@ -4932,15 +5524,15 @@
           <p:nvPr/>
         </p:nvPicPr>
         <p:blipFill>
-          <a:blip r:embed="rId2"/>
+          <a:blip r:embed="rId3"/>
           <a:stretch>
             <a:fillRect/>
           </a:stretch>
         </p:blipFill>
         <p:spPr bwMode="auto">
           <a:xfrm>
-            <a:off x="4673600" y="1079500"/>
-            <a:ext cx="4318000" cy="5359400"/>
+            <a:off x="5524500" y="1371600"/>
+            <a:ext cx="3822700" cy="4749800"/>
           </a:xfrm>
           <a:prstGeom prst="rect">
             <a:avLst/>
@@ -4953,6 +5545,36 @@
           </a:ln>
         </p:spPr>
       </p:pic>
+      <p:sp>
+        <p:nvSpPr>
+          <p:cNvPr id="1" name="TextBox 3"/>
+          <p:cNvSpPr txBox="1"/>
+          <p:nvPr/>
+        </p:nvSpPr>
+        <p:spPr>
+          <a:xfrm>
+            <a:off x="5194300" y="6121400"/>
+            <a:ext cx="4483100" cy="508000"/>
+          </a:xfrm>
+          <a:prstGeom prst="rect">
+            <a:avLst/>
+          </a:prstGeom>
+          <a:noFill/>
+        </p:spPr>
+        <p:txBody>
+          <a:bodyPr/>
+          <a:lstStyle/>
+          <a:p>
+            <a:pPr lvl="0" indent="0" marL="0" algn="ctr">
+              <a:buNone/>
+            </a:pPr>
+            <a:r>
+              <a:rPr/>
+              <a:t>title of figure</a:t>
+            </a:r>
+          </a:p>
+        </p:txBody>
+      </p:sp>
     </p:spTree>
   </p:cSld>
 </p:sld>
@@ -4995,81 +5617,127 @@
             </a:pPr>
             <a:r>
               <a:rPr/>
-              <a:t>Example - three columns (should not work!) (6)</a:t>
-            </a:r>
-          </a:p>
-        </p:txBody>
-      </p:sp>
-      <p:sp>
-        <p:nvSpPr>
-          <p:cNvPr id="3" name="Content Placeholder 2"/>
-          <p:cNvSpPr>
-            <a:spLocks noGrp="1"/>
-          </p:cNvSpPr>
-          <p:nvPr>
-            <p:ph idx="1" sz="half"/>
-          </p:nvPr>
-        </p:nvSpPr>
-        <p:spPr/>
-        <p:txBody>
-          <a:bodyPr/>
-          <a:lstStyle/>
-          <a:p>
-            <a:pPr lvl="0" indent="0" marL="0">
-              <a:spcBef>
-                <a:spcPts val="3000"/>
-              </a:spcBef>
+              <a:t>Two Content with Images Only (6)</a:t>
+            </a:r>
+          </a:p>
+        </p:txBody>
+      </p:sp>
+      <p:pic>
+        <p:nvPicPr>
+          <p:cNvPr descr="student-pictures-example.png" id="0" name="Picture 1"/>
+          <p:cNvPicPr>
+            <a:picLocks noGrp="1" noChangeAspect="1"/>
+          </p:cNvPicPr>
+          <p:nvPr/>
+        </p:nvPicPr>
+        <p:blipFill>
+          <a:blip r:embed="rId3"/>
+          <a:stretch>
+            <a:fillRect/>
+          </a:stretch>
+        </p:blipFill>
+        <p:spPr bwMode="auto">
+          <a:xfrm>
+            <a:off x="685800" y="1371600"/>
+            <a:ext cx="3822700" cy="4749800"/>
+          </a:xfrm>
+          <a:prstGeom prst="rect">
+            <a:avLst/>
+          </a:prstGeom>
+          <a:noFill/>
+          <a:ln w="9525">
+            <a:noFill/>
+            <a:headEnd/>
+            <a:tailEnd/>
+          </a:ln>
+        </p:spPr>
+      </p:pic>
+      <p:sp>
+        <p:nvSpPr>
+          <p:cNvPr id="1" name="TextBox 3"/>
+          <p:cNvSpPr txBox="1"/>
+          <p:nvPr/>
+        </p:nvSpPr>
+        <p:spPr>
+          <a:xfrm>
+            <a:off x="355600" y="6121400"/>
+            <a:ext cx="4483100" cy="508000"/>
+          </a:xfrm>
+          <a:prstGeom prst="rect">
+            <a:avLst/>
+          </a:prstGeom>
+          <a:noFill/>
+        </p:spPr>
+        <p:txBody>
+          <a:bodyPr/>
+          <a:lstStyle/>
+          <a:p>
+            <a:pPr lvl="0" indent="0" marL="0" algn="ctr">
               <a:buNone/>
             </a:pPr>
             <a:r>
-              <a:rPr b="1"/>
-              <a:t>Column 1 - sub title</a:t>
-            </a:r>
-          </a:p>
-          <a:p>
-            <a:pPr lvl="0" indent="0" marL="0">
+              <a:rPr/>
+              <a:t>title of figure</a:t>
+            </a:r>
+          </a:p>
+        </p:txBody>
+      </p:sp>
+      <p:pic>
+        <p:nvPicPr>
+          <p:cNvPr descr="student-pictures-example.png" id="0" name="Picture 1"/>
+          <p:cNvPicPr>
+            <a:picLocks noGrp="1" noChangeAspect="1"/>
+          </p:cNvPicPr>
+          <p:nvPr/>
+        </p:nvPicPr>
+        <p:blipFill>
+          <a:blip r:embed="rId4"/>
+          <a:stretch>
+            <a:fillRect/>
+          </a:stretch>
+        </p:blipFill>
+        <p:spPr bwMode="auto">
+          <a:xfrm>
+            <a:off x="5524500" y="1371600"/>
+            <a:ext cx="3822700" cy="4749800"/>
+          </a:xfrm>
+          <a:prstGeom prst="rect">
+            <a:avLst/>
+          </a:prstGeom>
+          <a:noFill/>
+          <a:ln w="9525">
+            <a:noFill/>
+            <a:headEnd/>
+            <a:tailEnd/>
+          </a:ln>
+        </p:spPr>
+      </p:pic>
+      <p:sp>
+        <p:nvSpPr>
+          <p:cNvPr id="1" name="TextBox 3"/>
+          <p:cNvSpPr txBox="1"/>
+          <p:nvPr/>
+        </p:nvSpPr>
+        <p:spPr>
+          <a:xfrm>
+            <a:off x="5194300" y="6121400"/>
+            <a:ext cx="4483100" cy="508000"/>
+          </a:xfrm>
+          <a:prstGeom prst="rect">
+            <a:avLst/>
+          </a:prstGeom>
+          <a:noFill/>
+        </p:spPr>
+        <p:txBody>
+          <a:bodyPr/>
+          <a:lstStyle/>
+          <a:p>
+            <a:pPr lvl="0" indent="0" marL="0" algn="ctr">
               <a:buNone/>
             </a:pPr>
             <a:r>
               <a:rPr/>
-              <a:t>Lorem ipsum dolor sit amet, consectetur adipiscing elit. Donec vel ligula vel ligula sodales euismod. In commodo in nunc a faucibus. Fusce ut est vel neque ultricies tempus. Vivamus convallis ultrices diam, vel dignissim nibh dignissim non. Suspendisse aliquam in mauris et egestas. Aenean interdum pellentesque ligula ut laoreet. Nam eu augue sit amet ex consequat porttitor eget non risus. Duis dictum est eu placerat efficitur. In fermentum dictum lorem, eu vehicula dui semper a. Quisque ante erat, consequat non pellentesque in, maximus id dui. Maecenas mattis aliquet neque, vel ornare ex malesuada et.</a:t>
-            </a:r>
-          </a:p>
-        </p:txBody>
-      </p:sp>
-      <p:sp>
-        <p:nvSpPr>
-          <p:cNvPr id="4" name="Content Placeholder 3"/>
-          <p:cNvSpPr>
-            <a:spLocks noGrp="1"/>
-          </p:cNvSpPr>
-          <p:nvPr>
-            <p:ph idx="2" sz="half"/>
-          </p:nvPr>
-        </p:nvSpPr>
-        <p:spPr/>
-        <p:txBody>
-          <a:bodyPr/>
-          <a:lstStyle/>
-          <a:p>
-            <a:pPr lvl="0" indent="0" marL="0">
-              <a:spcBef>
-                <a:spcPts val="3000"/>
-              </a:spcBef>
-              <a:buNone/>
-            </a:pPr>
-            <a:r>
-              <a:rPr b="1"/>
-              <a:t>Column 2 - sub title</a:t>
-            </a:r>
-          </a:p>
-          <a:p>
-            <a:pPr lvl="0" indent="0" marL="0">
-              <a:buNone/>
-            </a:pPr>
-            <a:r>
-              <a:rPr/>
-              <a:t>Lorem ipsum dolor sit amet, consectetur adipiscing elit. Donec vel ligula vel ligula sodales euismod. In commodo in nunc a faucibus. Fusce ut est vel neque ultricies tempus. Vivamus convallis ultrices diam, vel dignissim nibh dignissim non. Suspendisse aliquam in mauris et egestas. Aenean interdum pellentesque ligula ut laoreet. Nam eu augue sit amet ex consequat porttitor eget non risus. Duis dictum est eu placerat efficitur. In fermentum dictum lorem, eu vehicula dui semper a. Quisque ante erat, consequat non pellentesque in, maximus id dui. Maecenas mattis aliquet neque, vel ornare ex malesuada et.</a:t>
+              <a:t>title of figure</a:t>
             </a:r>
           </a:p>
         </p:txBody>
@@ -5096,6 +5764,212 @@
           <a:chExt cx="0" cy="0"/>
         </a:xfrm>
       </p:grpSpPr>
+      <p:sp>
+        <p:nvSpPr>
+          <p:cNvPr id="2" name="Title 1"/>
+          <p:cNvSpPr>
+            <a:spLocks noGrp="1"/>
+          </p:cNvSpPr>
+          <p:nvPr>
+            <p:ph type="title"/>
+          </p:nvPr>
+        </p:nvSpPr>
+        <p:spPr>
+          <a:xfrm>
+            <a:off x="356616" y="356616"/>
+            <a:ext cx="7543800" cy="356616"/>
+          </a:xfrm>
+        </p:spPr>
+        <p:txBody>
+          <a:bodyPr/>
+          <a:lstStyle/>
+          <a:p>
+            <a:pPr lvl="0" indent="0" marL="0">
+              <a:buNone/>
+            </a:pPr>
+            <a:r>
+              <a:rPr/>
+              <a:t>Comparison (7)</a:t>
+            </a:r>
+          </a:p>
+        </p:txBody>
+      </p:sp>
+      <p:sp>
+        <p:nvSpPr>
+          <p:cNvPr id="3" name="Text Placeholder 2"/>
+          <p:cNvSpPr>
+            <a:spLocks noGrp="1"/>
+          </p:cNvSpPr>
+          <p:nvPr>
+            <p:ph idx="1" type="body"/>
+          </p:nvPr>
+        </p:nvSpPr>
+        <p:spPr/>
+        <p:txBody>
+          <a:bodyPr/>
+          <a:lstStyle/>
+          <a:p>
+            <a:pPr lvl="0" indent="0" marL="0">
+              <a:spcBef>
+                <a:spcPts val="3000"/>
+              </a:spcBef>
+              <a:buNone/>
+            </a:pPr>
+            <a:r>
+              <a:rPr b="1"/>
+              <a:t>Column 1 - sub title</a:t>
+            </a:r>
+          </a:p>
+        </p:txBody>
+      </p:sp>
+      <p:pic>
+        <p:nvPicPr>
+          <p:cNvPr descr="student-pictures-example.png" id="0" name="Picture 1"/>
+          <p:cNvPicPr>
+            <a:picLocks noGrp="1" noChangeAspect="1"/>
+          </p:cNvPicPr>
+          <p:nvPr/>
+        </p:nvPicPr>
+        <p:blipFill>
+          <a:blip r:embed="rId3"/>
+          <a:stretch>
+            <a:fillRect/>
+          </a:stretch>
+        </p:blipFill>
+        <p:spPr bwMode="auto">
+          <a:xfrm>
+            <a:off x="1143000" y="2514600"/>
+            <a:ext cx="2908300" cy="3606800"/>
+          </a:xfrm>
+          <a:prstGeom prst="rect">
+            <a:avLst/>
+          </a:prstGeom>
+          <a:noFill/>
+          <a:ln w="9525">
+            <a:noFill/>
+            <a:headEnd/>
+            <a:tailEnd/>
+          </a:ln>
+        </p:spPr>
+      </p:pic>
+      <p:sp>
+        <p:nvSpPr>
+          <p:cNvPr id="1" name="TextBox 3"/>
+          <p:cNvSpPr txBox="1"/>
+          <p:nvPr/>
+        </p:nvSpPr>
+        <p:spPr>
+          <a:xfrm>
+            <a:off x="355600" y="6121400"/>
+            <a:ext cx="4483100" cy="508000"/>
+          </a:xfrm>
+          <a:prstGeom prst="rect">
+            <a:avLst/>
+          </a:prstGeom>
+          <a:noFill/>
+        </p:spPr>
+        <p:txBody>
+          <a:bodyPr/>
+          <a:lstStyle/>
+          <a:p>
+            <a:pPr lvl="0" indent="0" marL="0" algn="ctr">
+              <a:buNone/>
+            </a:pPr>
+            <a:r>
+              <a:rPr/>
+              <a:t>title of figure</a:t>
+            </a:r>
+          </a:p>
+        </p:txBody>
+      </p:sp>
+      <p:sp>
+        <p:nvSpPr>
+          <p:cNvPr id="5" name="Text Placeholder 4"/>
+          <p:cNvSpPr>
+            <a:spLocks noGrp="1"/>
+          </p:cNvSpPr>
+          <p:nvPr>
+            <p:ph idx="3" sz="quarter" type="body"/>
+          </p:nvPr>
+        </p:nvSpPr>
+        <p:spPr/>
+        <p:txBody>
+          <a:bodyPr/>
+          <a:lstStyle/>
+          <a:p>
+            <a:pPr lvl="0" indent="0" marL="0">
+              <a:spcBef>
+                <a:spcPts val="3000"/>
+              </a:spcBef>
+              <a:buNone/>
+            </a:pPr>
+            <a:r>
+              <a:rPr b="1"/>
+              <a:t>Column 2 - sub title</a:t>
+            </a:r>
+          </a:p>
+        </p:txBody>
+      </p:sp>
+      <p:pic>
+        <p:nvPicPr>
+          <p:cNvPr descr="student-pictures-example.png" id="0" name="Picture 1"/>
+          <p:cNvPicPr>
+            <a:picLocks noGrp="1" noChangeAspect="1"/>
+          </p:cNvPicPr>
+          <p:nvPr/>
+        </p:nvPicPr>
+        <p:blipFill>
+          <a:blip r:embed="rId4"/>
+          <a:stretch>
+            <a:fillRect/>
+          </a:stretch>
+        </p:blipFill>
+        <p:spPr bwMode="auto">
+          <a:xfrm>
+            <a:off x="5981700" y="2514600"/>
+            <a:ext cx="2908300" cy="3606800"/>
+          </a:xfrm>
+          <a:prstGeom prst="rect">
+            <a:avLst/>
+          </a:prstGeom>
+          <a:noFill/>
+          <a:ln w="9525">
+            <a:noFill/>
+            <a:headEnd/>
+            <a:tailEnd/>
+          </a:ln>
+        </p:spPr>
+      </p:pic>
+      <p:sp>
+        <p:nvSpPr>
+          <p:cNvPr id="1" name="TextBox 3"/>
+          <p:cNvSpPr txBox="1"/>
+          <p:nvPr/>
+        </p:nvSpPr>
+        <p:spPr>
+          <a:xfrm>
+            <a:off x="5194300" y="6121400"/>
+            <a:ext cx="4483100" cy="508000"/>
+          </a:xfrm>
+          <a:prstGeom prst="rect">
+            <a:avLst/>
+          </a:prstGeom>
+          <a:noFill/>
+        </p:spPr>
+        <p:txBody>
+          <a:bodyPr/>
+          <a:lstStyle/>
+          <a:p>
+            <a:pPr lvl="0" indent="0" marL="0" algn="ctr">
+              <a:buNone/>
+            </a:pPr>
+            <a:r>
+              <a:rPr/>
+              <a:t>title of figure</a:t>
+            </a:r>
+          </a:p>
+        </p:txBody>
+      </p:sp>
     </p:spTree>
   </p:cSld>
 </p:sld>
@@ -5120,12 +5994,48 @@
       </p:grpSpPr>
       <p:sp>
         <p:nvSpPr>
-          <p:cNvPr id="3" name="Content Placeholder 2"/>
-          <p:cNvSpPr>
-            <a:spLocks noGrp="1"/>
-          </p:cNvSpPr>
-          <p:nvPr>
-            <p:ph idx="1"/>
+          <p:cNvPr id="8" name="Title 1">
+            <a:extLst>
+              <a:ext uri="{FF2B5EF4-FFF2-40B4-BE49-F238E27FC236}">
+                <a16:creationId xmlns:a16="http://schemas.microsoft.com/office/drawing/2014/main" id="{FE8BC51B-A3B5-0244-248D-9BF72AE487BD}"/>
+              </a:ext>
+            </a:extLst>
+          </p:cNvPr>
+          <p:cNvSpPr>
+            <a:spLocks noGrp="1"/>
+          </p:cNvSpPr>
+          <p:nvPr>
+            <p:ph type="title"/>
+          </p:nvPr>
+        </p:nvSpPr>
+        <p:spPr>
+          <a:xfrm>
+            <a:off x="356616" y="356616"/>
+            <a:ext cx="7543800" cy="356616"/>
+          </a:xfrm>
+        </p:spPr>
+        <p:txBody>
+          <a:bodyPr/>
+          <a:lstStyle/>
+          <a:p>
+            <a:pPr lvl="0" indent="0" marL="0">
+              <a:buNone/>
+            </a:pPr>
+            <a:r>
+              <a:rPr/>
+              <a:t>Content with Caption (7)</a:t>
+            </a:r>
+          </a:p>
+        </p:txBody>
+      </p:sp>
+      <p:sp>
+        <p:nvSpPr>
+          <p:cNvPr id="4" name="Text Placeholder 3"/>
+          <p:cNvSpPr>
+            <a:spLocks noGrp="1"/>
+          </p:cNvSpPr>
+          <p:nvPr>
+            <p:ph idx="2" sz="half" type="body"/>
           </p:nvPr>
         </p:nvSpPr>
         <p:spPr/>
@@ -5138,47 +6048,76 @@
             </a:pPr>
             <a:r>
               <a:rPr/>
-              <a:t>Looks like background color isn’t working.</a:t>
+              <a:t>This layout is used for any non-two-column slides which contain text followed by non-text media (e.g. an image or a table)</a:t>
             </a:r>
           </a:p>
           <a:p>
             <a:pPr lvl="0" indent="0" marL="0">
-              <a:spcBef>
-                <a:spcPts val="3000"/>
-              </a:spcBef>
               <a:buNone/>
             </a:pPr>
             <a:r>
-              <a:rPr b="1"/>
-              <a:t>Example - Title and Content (8)</a:t>
-            </a:r>
-          </a:p>
-          <a:p>
-            <a:pPr lvl="0"/>
-            <a:r>
               <a:rPr/>
-              <a:t>This is an example of a slide without a title.</a:t>
-            </a:r>
-          </a:p>
-          <a:p>
-            <a:pPr lvl="0"/>
+              <a:t>Lorem ipsum dolor sit amet, consectetur adipiscing elit. Donec vel ligula vel ligula sodales euismod. In commodo in nunc a faucibus. Fusce ut est vel neque ultricies tempus. Vivamus convallis ultrices diam, vel dignissim nibh dignissim non. Suspendisse aliquam in mauris et egestas. Aenean interdum pellentesque ligula ut laoreet. Nam eu augue sit amet ex consequat porttitor eget non risus. Duis dictum est eu placerat efficitur. In fermentum dictum lorem, eu vehicula dui semper a. Quisque ante erat, consequat non pellentesque in, maximus id dui. Maecenas mattis aliquet neque, vel ornare ex malesuada et.</a:t>
+            </a:r>
+          </a:p>
+        </p:txBody>
+      </p:sp>
+      <p:pic>
+        <p:nvPicPr>
+          <p:cNvPr descr="student-pictures-example.png" id="0" name="Picture 1"/>
+          <p:cNvPicPr>
+            <a:picLocks noGrp="1" noChangeAspect="1"/>
+          </p:cNvPicPr>
+          <p:nvPr/>
+        </p:nvPicPr>
+        <p:blipFill>
+          <a:blip r:embed="rId3"/>
+          <a:stretch>
+            <a:fillRect/>
+          </a:stretch>
+        </p:blipFill>
+        <p:spPr bwMode="auto">
+          <a:xfrm>
+            <a:off x="4737100" y="1371600"/>
+            <a:ext cx="3822700" cy="4749800"/>
+          </a:xfrm>
+          <a:prstGeom prst="rect">
+            <a:avLst/>
+          </a:prstGeom>
+          <a:noFill/>
+          <a:ln w="9525">
+            <a:noFill/>
+            <a:headEnd/>
+            <a:tailEnd/>
+          </a:ln>
+        </p:spPr>
+      </p:pic>
+      <p:sp>
+        <p:nvSpPr>
+          <p:cNvPr id="1" name="TextBox 3"/>
+          <p:cNvSpPr txBox="1"/>
+          <p:nvPr/>
+        </p:nvSpPr>
+        <p:spPr>
+          <a:xfrm>
+            <a:off x="3949700" y="6121400"/>
+            <a:ext cx="5410200" cy="508000"/>
+          </a:xfrm>
+          <a:prstGeom prst="rect">
+            <a:avLst/>
+          </a:prstGeom>
+          <a:noFill/>
+        </p:spPr>
+        <p:txBody>
+          <a:bodyPr/>
+          <a:lstStyle/>
+          <a:p>
+            <a:pPr lvl="0" indent="0" marL="0" algn="ctr">
+              <a:buNone/>
+            </a:pPr>
             <a:r>
               <a:rPr/>
-              <a:t>This slide shows as “Title and Content”</a:t>
-            </a:r>
-          </a:p>
-          <a:p>
-            <a:pPr lvl="0"/>
-            <a:r>
-              <a:rPr/>
-              <a:t>Questions? :question: Post to discord! :grin:</a:t>
-            </a:r>
-          </a:p>
-          <a:p>
-            <a:pPr lvl="0"/>
-            <a:r>
-              <a:rPr/>
-              <a:t>Check to see if any of the emoji’s show. (The shouldn’t, PPTX is brittle and not easily controlled outside itself.)</a:t>
+              <a:t>title of figure</a:t>
             </a:r>
           </a:p>
         </p:txBody>
@@ -5205,96 +6144,6 @@
           <a:chExt cx="0" cy="0"/>
         </a:xfrm>
       </p:grpSpPr>
-      <p:sp>
-        <p:nvSpPr>
-          <p:cNvPr id="2" name="Title 1"/>
-          <p:cNvSpPr>
-            <a:spLocks noGrp="1"/>
-          </p:cNvSpPr>
-          <p:nvPr>
-            <p:ph type="title"/>
-          </p:nvPr>
-        </p:nvSpPr>
-        <p:spPr/>
-        <p:txBody>
-          <a:bodyPr/>
-          <a:lstStyle/>
-          <a:p>
-            <a:pPr lvl="0" indent="0" marL="0">
-              <a:buNone/>
-            </a:pPr>
-            <a:r>
-              <a:rPr/>
-              <a:t>Example - Disgrams</a:t>
-            </a:r>
-          </a:p>
-        </p:txBody>
-      </p:sp>
-      <p:sp>
-        <p:nvSpPr>
-          <p:cNvPr id="3" name="Content Placeholder 2"/>
-          <p:cNvSpPr>
-            <a:spLocks noGrp="1"/>
-          </p:cNvSpPr>
-          <p:nvPr>
-            <p:ph idx="1"/>
-          </p:nvPr>
-        </p:nvSpPr>
-        <p:spPr/>
-        <p:txBody>
-          <a:bodyPr/>
-          <a:lstStyle/>
-          <a:p>
-            <a:pPr lvl="0"/>
-            <a:r>
-              <a:rPr/>
-              <a:t>The two slides highlight diagrams:</a:t>
-            </a:r>
-          </a:p>
-          <a:p>
-            <a:pPr lvl="1"/>
-            <a:r>
-              <a:rPr/>
-              <a:t>see: https://quarto.org/docs/authoring/diagrams.html#overview</a:t>
-            </a:r>
-          </a:p>
-          <a:p>
-            <a:pPr lvl="0"/>
-            <a:r>
-              <a:rPr/>
-              <a:t>Mermaid diagrams:</a:t>
-            </a:r>
-          </a:p>
-          <a:p>
-            <a:pPr lvl="1"/>
-            <a:r>
-              <a:rPr/>
-              <a:t>https://mermaid.js.org/config/Tutorials.html</a:t>
-            </a:r>
-          </a:p>
-          <a:p>
-            <a:pPr lvl="0"/>
-            <a:r>
-              <a:rPr/>
-              <a:t>GraphViz diagrams:</a:t>
-            </a:r>
-          </a:p>
-          <a:p>
-            <a:pPr lvl="1"/>
-            <a:r>
-              <a:rPr/>
-              <a:t>https://graphviz.org/gallery/</a:t>
-            </a:r>
-          </a:p>
-          <a:p>
-            <a:pPr lvl="0"/>
-            <a:r>
-              <a:rPr/>
-              <a:t>IT WOULD BE NICE to create styles (using the mermaid and graphviz) instructions that match with the presentation styles, so a user doesn’t need to worry about styles, we just go for it!</a:t>
-            </a:r>
-          </a:p>
-        </p:txBody>
-      </p:sp>
     </p:spTree>
   </p:cSld>
 </p:sld>

</xml_diff>